<commit_message>
slides for weekly meeting added
</commit_message>
<xml_diff>
--- a/docs/surf_PiCas_Dec_05.pptx
+++ b/docs/surf_PiCas_Dec_05.pptx
@@ -5,7 +5,7 @@
     <p:sldMasterId id="2147483661" r:id="rId1"/>
   </p:sldMasterIdLst>
   <p:notesMasterIdLst>
-    <p:notesMasterId r:id="rId11"/>
+    <p:notesMasterId r:id="rId12"/>
   </p:notesMasterIdLst>
   <p:sldIdLst>
     <p:sldId id="259" r:id="rId2"/>
@@ -14,9 +14,10 @@
     <p:sldId id="593" r:id="rId5"/>
     <p:sldId id="465" r:id="rId6"/>
     <p:sldId id="594" r:id="rId7"/>
-    <p:sldId id="523" r:id="rId8"/>
-    <p:sldId id="595" r:id="rId9"/>
-    <p:sldId id="571" r:id="rId10"/>
+    <p:sldId id="597" r:id="rId8"/>
+    <p:sldId id="523" r:id="rId9"/>
+    <p:sldId id="595" r:id="rId10"/>
+    <p:sldId id="571" r:id="rId11"/>
   </p:sldIdLst>
   <p:sldSz cx="12984163" cy="6858000"/>
   <p:notesSz cx="6858000" cy="9144000"/>
@@ -10575,6 +10576,183 @@
 </p:sld>
 </file>
 
+<file path=ppt/slides/slide10.xml><?xml version="1.0" encoding="utf-8"?>
+<p:sld xmlns:a="http://schemas.openxmlformats.org/drawingml/2006/main" xmlns:r="http://schemas.openxmlformats.org/officeDocument/2006/relationships" xmlns:p="http://schemas.openxmlformats.org/presentationml/2006/main">
+  <p:cSld>
+    <p:spTree>
+      <p:nvGrpSpPr>
+        <p:cNvPr id="1" name=""/>
+        <p:cNvGrpSpPr/>
+        <p:nvPr/>
+      </p:nvGrpSpPr>
+      <p:grpSpPr>
+        <a:xfrm>
+          <a:off x="0" y="0"/>
+          <a:ext cx="0" cy="0"/>
+          <a:chOff x="0" y="0"/>
+          <a:chExt cx="0" cy="0"/>
+        </a:xfrm>
+      </p:grpSpPr>
+      <p:sp>
+        <p:nvSpPr>
+          <p:cNvPr id="15" name="TextBox 14">
+            <a:extLst>
+              <a:ext uri="{FF2B5EF4-FFF2-40B4-BE49-F238E27FC236}">
+                <a16:creationId xmlns:a16="http://schemas.microsoft.com/office/drawing/2014/main" id="{71F8D981-82E6-0AB1-BBBA-08024F125D16}"/>
+              </a:ext>
+            </a:extLst>
+          </p:cNvPr>
+          <p:cNvSpPr txBox="1"/>
+          <p:nvPr/>
+        </p:nvSpPr>
+        <p:spPr>
+          <a:xfrm>
+            <a:off x="402675" y="838780"/>
+            <a:ext cx="6547425" cy="1323439"/>
+          </a:xfrm>
+          <a:prstGeom prst="rect">
+            <a:avLst/>
+          </a:prstGeom>
+          <a:noFill/>
+        </p:spPr>
+        <p:txBody>
+          <a:bodyPr wrap="square" rtlCol="0">
+            <a:spAutoFit/>
+          </a:bodyPr>
+          <a:lstStyle/>
+          <a:p>
+            <a:pPr marL="381003" indent="-381003">
+              <a:buFont typeface="Wingdings" panose="05000000000000000000" pitchFamily="2" charset="2"/>
+              <a:buChar char="ü"/>
+            </a:pPr>
+            <a:r>
+              <a:rPr lang="en-US" sz="1867" dirty="0"/>
+              <a:t>No GPU resource on spider</a:t>
+            </a:r>
+          </a:p>
+          <a:p>
+            <a:pPr marL="381003" indent="-381003">
+              <a:buFont typeface="Wingdings" panose="05000000000000000000" pitchFamily="2" charset="2"/>
+              <a:buChar char="ü"/>
+            </a:pPr>
+            <a:r>
+              <a:rPr lang="en-US" sz="1867" dirty="0"/>
+              <a:t>Send me your GitHub usernames</a:t>
+            </a:r>
+          </a:p>
+          <a:p>
+            <a:endParaRPr lang="en-US" sz="2133" dirty="0"/>
+          </a:p>
+          <a:p>
+            <a:pPr marL="381003" indent="-381003">
+              <a:buFont typeface="Wingdings" panose="05000000000000000000" pitchFamily="2" charset="2"/>
+              <a:buChar char="ü"/>
+            </a:pPr>
+            <a:endParaRPr lang="LID4096" sz="2133" dirty="0"/>
+          </a:p>
+        </p:txBody>
+      </p:sp>
+      <p:sp>
+        <p:nvSpPr>
+          <p:cNvPr id="4" name="Title 1">
+            <a:extLst>
+              <a:ext uri="{FF2B5EF4-FFF2-40B4-BE49-F238E27FC236}">
+                <a16:creationId xmlns:a16="http://schemas.microsoft.com/office/drawing/2014/main" id="{0814C2D1-6846-10C7-29DB-26225B7506D9}"/>
+              </a:ext>
+            </a:extLst>
+          </p:cNvPr>
+          <p:cNvSpPr>
+            <a:spLocks noGrp="1"/>
+          </p:cNvSpPr>
+          <p:nvPr>
+            <p:ph type="title"/>
+          </p:nvPr>
+        </p:nvSpPr>
+        <p:spPr>
+          <a:xfrm>
+            <a:off x="478641" y="15030"/>
+            <a:ext cx="9874044" cy="443000"/>
+          </a:xfrm>
+        </p:spPr>
+        <p:txBody>
+          <a:bodyPr>
+            <a:normAutofit/>
+          </a:bodyPr>
+          <a:lstStyle/>
+          <a:p>
+            <a:r>
+              <a:rPr lang="en-US" sz="1314" b="1" dirty="0">
+                <a:solidFill>
+                  <a:schemeClr val="accent1"/>
+                </a:solidFill>
+                <a:latin typeface="Avenir Next" panose="020B0503020202020204" pitchFamily="34" charset="0"/>
+              </a:rPr>
+              <a:t>Reminder</a:t>
+            </a:r>
+            <a:endParaRPr lang="en-NL" sz="1314" b="1" dirty="0">
+              <a:solidFill>
+                <a:schemeClr val="accent1"/>
+              </a:solidFill>
+              <a:latin typeface="Avenir Next" panose="020B0503020202020204" pitchFamily="34" charset="0"/>
+            </a:endParaRPr>
+          </a:p>
+        </p:txBody>
+      </p:sp>
+      <p:pic>
+        <p:nvPicPr>
+          <p:cNvPr id="5" name="Content Placeholder 5">
+            <a:extLst>
+              <a:ext uri="{FF2B5EF4-FFF2-40B4-BE49-F238E27FC236}">
+                <a16:creationId xmlns:a16="http://schemas.microsoft.com/office/drawing/2014/main" id="{A8C9261E-9AB2-5FC2-1EED-856C6C8F2BF8}"/>
+              </a:ext>
+            </a:extLst>
+          </p:cNvPr>
+          <p:cNvPicPr>
+            <a:picLocks noChangeAspect="1"/>
+          </p:cNvPicPr>
+          <p:nvPr/>
+        </p:nvPicPr>
+        <p:blipFill>
+          <a:blip r:embed="rId2"/>
+          <a:stretch>
+            <a:fillRect/>
+          </a:stretch>
+        </p:blipFill>
+        <p:spPr>
+          <a:xfrm>
+            <a:off x="12179100" y="6320245"/>
+            <a:ext cx="643777" cy="487304"/>
+          </a:xfrm>
+          <a:prstGeom prst="rect">
+            <a:avLst/>
+          </a:prstGeom>
+        </p:spPr>
+      </p:pic>
+    </p:spTree>
+    <p:extLst>
+      <p:ext uri="{BB962C8B-B14F-4D97-AF65-F5344CB8AC3E}">
+        <p14:creationId xmlns:p14="http://schemas.microsoft.com/office/powerpoint/2010/main" val="1187055163"/>
+      </p:ext>
+    </p:extLst>
+  </p:cSld>
+  <p:clrMapOvr>
+    <a:masterClrMapping/>
+  </p:clrMapOvr>
+  <mc:AlternateContent xmlns:mc="http://schemas.openxmlformats.org/markup-compatibility/2006" xmlns:p14="http://schemas.microsoft.com/office/powerpoint/2010/main">
+    <mc:Choice Requires="p14">
+      <p:transition spd="med" p14:dur="700">
+        <p:fade/>
+      </p:transition>
+    </mc:Choice>
+    <mc:Fallback xmlns="">
+      <p:transition spd="med">
+        <p:fade/>
+      </p:transition>
+    </mc:Fallback>
+  </mc:AlternateContent>
+</p:sld>
+</file>
+
 <file path=ppt/slides/slide2.xml><?xml version="1.0" encoding="utf-8"?>
 <p:sld xmlns:a="http://schemas.openxmlformats.org/drawingml/2006/main" xmlns:r="http://schemas.openxmlformats.org/officeDocument/2006/relationships" xmlns:p="http://schemas.openxmlformats.org/presentationml/2006/main">
   <p:cSld>
@@ -11179,13 +11357,13 @@
   <p:clrMapOvr>
     <a:masterClrMapping/>
   </p:clrMapOvr>
-  <mc:AlternateContent xmlns:mc="http://schemas.openxmlformats.org/markup-compatibility/2006">
-    <mc:Choice xmlns:p14="http://schemas.microsoft.com/office/powerpoint/2010/main" Requires="p14">
+  <mc:AlternateContent xmlns:mc="http://schemas.openxmlformats.org/markup-compatibility/2006" xmlns:p14="http://schemas.microsoft.com/office/powerpoint/2010/main">
+    <mc:Choice Requires="p14">
       <p:transition spd="med" p14:dur="700">
         <p:fade/>
       </p:transition>
     </mc:Choice>
-    <mc:Fallback>
+    <mc:Fallback xmlns="">
       <p:transition spd="med">
         <p:fade/>
       </p:transition>
@@ -11825,7 +12003,7 @@
             </a:pPr>
             <a:r>
               <a:rPr lang="en-US" sz="1867" dirty="0"/>
-              <a:t>Prepare singularity images for tasks (for models from Computer vision group)</a:t>
+              <a:t>Prepare singularity images for tasks (models from Computer vision group)</a:t>
             </a:r>
           </a:p>
           <a:p>
@@ -11925,6 +12103,318 @@
   <p:clrMapOvr>
     <a:masterClrMapping/>
   </p:clrMapOvr>
+  <mc:AlternateContent xmlns:mc="http://schemas.openxmlformats.org/markup-compatibility/2006" xmlns:p14="http://schemas.microsoft.com/office/powerpoint/2010/main">
+    <mc:Choice Requires="p14">
+      <p:transition spd="med" p14:dur="700">
+        <p:fade/>
+      </p:transition>
+    </mc:Choice>
+    <mc:Fallback xmlns="">
+      <p:transition spd="med">
+        <p:fade/>
+      </p:transition>
+    </mc:Fallback>
+  </mc:AlternateContent>
+</p:sld>
+</file>
+
+<file path=ppt/slides/slide7.xml><?xml version="1.0" encoding="utf-8"?>
+<p:sld xmlns:a="http://schemas.openxmlformats.org/drawingml/2006/main" xmlns:r="http://schemas.openxmlformats.org/officeDocument/2006/relationships" xmlns:p="http://schemas.openxmlformats.org/presentationml/2006/main">
+  <p:cSld>
+    <p:spTree>
+      <p:nvGrpSpPr>
+        <p:cNvPr id="1" name=""/>
+        <p:cNvGrpSpPr/>
+        <p:nvPr/>
+      </p:nvGrpSpPr>
+      <p:grpSpPr>
+        <a:xfrm>
+          <a:off x="0" y="0"/>
+          <a:ext cx="0" cy="0"/>
+          <a:chOff x="0" y="0"/>
+          <a:chExt cx="0" cy="0"/>
+        </a:xfrm>
+      </p:grpSpPr>
+      <p:pic>
+        <p:nvPicPr>
+          <p:cNvPr id="5" name="Content Placeholder 5">
+            <a:extLst>
+              <a:ext uri="{FF2B5EF4-FFF2-40B4-BE49-F238E27FC236}">
+                <a16:creationId xmlns:a16="http://schemas.microsoft.com/office/drawing/2014/main" id="{A8C9261E-9AB2-5FC2-1EED-856C6C8F2BF8}"/>
+              </a:ext>
+            </a:extLst>
+          </p:cNvPr>
+          <p:cNvPicPr>
+            <a:picLocks noChangeAspect="1"/>
+          </p:cNvPicPr>
+          <p:nvPr/>
+        </p:nvPicPr>
+        <p:blipFill>
+          <a:blip r:embed="rId2"/>
+          <a:stretch>
+            <a:fillRect/>
+          </a:stretch>
+        </p:blipFill>
+        <p:spPr>
+          <a:xfrm>
+            <a:off x="12179100" y="6320245"/>
+            <a:ext cx="643777" cy="487304"/>
+          </a:xfrm>
+          <a:prstGeom prst="rect">
+            <a:avLst/>
+          </a:prstGeom>
+        </p:spPr>
+      </p:pic>
+      <p:sp>
+        <p:nvSpPr>
+          <p:cNvPr id="6" name="Title 1">
+            <a:extLst>
+              <a:ext uri="{FF2B5EF4-FFF2-40B4-BE49-F238E27FC236}">
+                <a16:creationId xmlns:a16="http://schemas.microsoft.com/office/drawing/2014/main" id="{A56377DB-5151-6A4B-2584-F5511BBED9A5}"/>
+              </a:ext>
+            </a:extLst>
+          </p:cNvPr>
+          <p:cNvSpPr>
+            <a:spLocks noGrp="1"/>
+          </p:cNvSpPr>
+          <p:nvPr>
+            <p:ph type="title"/>
+          </p:nvPr>
+        </p:nvSpPr>
+        <p:spPr>
+          <a:xfrm>
+            <a:off x="478641" y="15030"/>
+            <a:ext cx="9874044" cy="443000"/>
+          </a:xfrm>
+        </p:spPr>
+        <p:txBody>
+          <a:bodyPr>
+            <a:normAutofit/>
+          </a:bodyPr>
+          <a:lstStyle/>
+          <a:p>
+            <a:r>
+              <a:rPr lang="en-US" sz="1314" b="1" dirty="0">
+                <a:solidFill>
+                  <a:schemeClr val="accent1"/>
+                </a:solidFill>
+                <a:latin typeface="Avenir Next" panose="020B0503020202020204" pitchFamily="34" charset="0"/>
+              </a:rPr>
+              <a:t>Plan for next week</a:t>
+            </a:r>
+            <a:endParaRPr lang="en-NL" sz="1314" b="1" dirty="0">
+              <a:solidFill>
+                <a:schemeClr val="accent1"/>
+              </a:solidFill>
+              <a:latin typeface="Avenir Next" panose="020B0503020202020204" pitchFamily="34" charset="0"/>
+            </a:endParaRPr>
+          </a:p>
+        </p:txBody>
+      </p:sp>
+      <p:sp>
+        <p:nvSpPr>
+          <p:cNvPr id="7" name="TextBox 6">
+            <a:extLst>
+              <a:ext uri="{FF2B5EF4-FFF2-40B4-BE49-F238E27FC236}">
+                <a16:creationId xmlns:a16="http://schemas.microsoft.com/office/drawing/2014/main" id="{B4F7AFA3-02E1-77F0-997E-6312CC9CE99B}"/>
+              </a:ext>
+            </a:extLst>
+          </p:cNvPr>
+          <p:cNvSpPr txBox="1"/>
+          <p:nvPr/>
+        </p:nvSpPr>
+        <p:spPr>
+          <a:xfrm>
+            <a:off x="679512" y="1962718"/>
+            <a:ext cx="6543410" cy="1898084"/>
+          </a:xfrm>
+          <a:prstGeom prst="rect">
+            <a:avLst/>
+          </a:prstGeom>
+          <a:noFill/>
+        </p:spPr>
+        <p:txBody>
+          <a:bodyPr wrap="square" rtlCol="0">
+            <a:spAutoFit/>
+          </a:bodyPr>
+          <a:lstStyle/>
+          <a:p>
+            <a:pPr marL="342900" indent="-342900">
+              <a:buFont typeface="Wingdings" panose="05000000000000000000" pitchFamily="2" charset="2"/>
+              <a:buChar char="ü"/>
+            </a:pPr>
+            <a:r>
+              <a:rPr lang="en-US" sz="1867" dirty="0"/>
+              <a:t>Input data validation</a:t>
+            </a:r>
+          </a:p>
+          <a:p>
+            <a:pPr marL="342900" indent="-342900">
+              <a:buFont typeface="Wingdings" panose="05000000000000000000" pitchFamily="2" charset="2"/>
+              <a:buChar char="ü"/>
+            </a:pPr>
+            <a:r>
+              <a:rPr lang="en-US" sz="1867" dirty="0"/>
+              <a:t>User authentication (user roles)</a:t>
+            </a:r>
+          </a:p>
+          <a:p>
+            <a:pPr lvl="1"/>
+            <a:br>
+              <a:rPr lang="en-US" sz="1867" dirty="0"/>
+            </a:br>
+            <a:endParaRPr lang="en-US" sz="1867" dirty="0"/>
+          </a:p>
+          <a:p>
+            <a:endParaRPr lang="en-US" sz="2133" dirty="0"/>
+          </a:p>
+          <a:p>
+            <a:pPr marL="381003" indent="-381003">
+              <a:buFont typeface="Wingdings" panose="05000000000000000000" pitchFamily="2" charset="2"/>
+              <a:buChar char="ü"/>
+            </a:pPr>
+            <a:endParaRPr lang="LID4096" sz="2133" dirty="0"/>
+          </a:p>
+        </p:txBody>
+      </p:sp>
+      <p:sp>
+        <p:nvSpPr>
+          <p:cNvPr id="8" name="TextBox 7">
+            <a:extLst>
+              <a:ext uri="{FF2B5EF4-FFF2-40B4-BE49-F238E27FC236}">
+                <a16:creationId xmlns:a16="http://schemas.microsoft.com/office/drawing/2014/main" id="{B00DC2B4-4FF5-4005-F387-ECD91F3030A9}"/>
+              </a:ext>
+            </a:extLst>
+          </p:cNvPr>
+          <p:cNvSpPr txBox="1"/>
+          <p:nvPr/>
+        </p:nvSpPr>
+        <p:spPr>
+          <a:xfrm>
+            <a:off x="478641" y="1389524"/>
+            <a:ext cx="1011624" cy="369332"/>
+          </a:xfrm>
+          <a:prstGeom prst="rect">
+            <a:avLst/>
+          </a:prstGeom>
+          <a:noFill/>
+        </p:spPr>
+        <p:txBody>
+          <a:bodyPr wrap="none" rtlCol="0">
+            <a:spAutoFit/>
+          </a:bodyPr>
+          <a:lstStyle/>
+          <a:p>
+            <a:r>
+              <a:rPr lang="en-US" b="1" dirty="0"/>
+              <a:t>WebApp</a:t>
+            </a:r>
+            <a:endParaRPr lang="LID4096" b="1" dirty="0"/>
+          </a:p>
+        </p:txBody>
+      </p:sp>
+      <p:sp>
+        <p:nvSpPr>
+          <p:cNvPr id="9" name="TextBox 8">
+            <a:extLst>
+              <a:ext uri="{FF2B5EF4-FFF2-40B4-BE49-F238E27FC236}">
+                <a16:creationId xmlns:a16="http://schemas.microsoft.com/office/drawing/2014/main" id="{0368F3A5-130A-DAB6-B50D-67D22CEDDFDC}"/>
+              </a:ext>
+            </a:extLst>
+          </p:cNvPr>
+          <p:cNvSpPr txBox="1"/>
+          <p:nvPr/>
+        </p:nvSpPr>
+        <p:spPr>
+          <a:xfrm>
+            <a:off x="478641" y="3975700"/>
+            <a:ext cx="991105" cy="369332"/>
+          </a:xfrm>
+          <a:prstGeom prst="rect">
+            <a:avLst/>
+          </a:prstGeom>
+          <a:noFill/>
+        </p:spPr>
+        <p:txBody>
+          <a:bodyPr wrap="none" rtlCol="0">
+            <a:spAutoFit/>
+          </a:bodyPr>
+          <a:lstStyle/>
+          <a:p>
+            <a:r>
+              <a:rPr lang="en-US" b="1" dirty="0"/>
+              <a:t>Backend</a:t>
+            </a:r>
+            <a:endParaRPr lang="LID4096" b="1" dirty="0"/>
+          </a:p>
+        </p:txBody>
+      </p:sp>
+      <p:sp>
+        <p:nvSpPr>
+          <p:cNvPr id="10" name="TextBox 9">
+            <a:extLst>
+              <a:ext uri="{FF2B5EF4-FFF2-40B4-BE49-F238E27FC236}">
+                <a16:creationId xmlns:a16="http://schemas.microsoft.com/office/drawing/2014/main" id="{773FC060-542F-BAB3-BDF8-F000C00F157D}"/>
+              </a:ext>
+            </a:extLst>
+          </p:cNvPr>
+          <p:cNvSpPr txBox="1"/>
+          <p:nvPr/>
+        </p:nvSpPr>
+        <p:spPr>
+          <a:xfrm>
+            <a:off x="783921" y="4548894"/>
+            <a:ext cx="9349980" cy="1610762"/>
+          </a:xfrm>
+          <a:prstGeom prst="rect">
+            <a:avLst/>
+          </a:prstGeom>
+          <a:noFill/>
+        </p:spPr>
+        <p:txBody>
+          <a:bodyPr wrap="square" rtlCol="0">
+            <a:spAutoFit/>
+          </a:bodyPr>
+          <a:lstStyle/>
+          <a:p>
+            <a:pPr marL="342900" indent="-342900">
+              <a:buFont typeface="Wingdings" panose="05000000000000000000" pitchFamily="2" charset="2"/>
+              <a:buChar char="ü"/>
+            </a:pPr>
+            <a:r>
+              <a:rPr lang="en-US" sz="1867" dirty="0"/>
+              <a:t>Prepare singularity images for tasks (models from Computer vision group)</a:t>
+            </a:r>
+          </a:p>
+          <a:p>
+            <a:pPr lvl="1"/>
+            <a:br>
+              <a:rPr lang="en-US" sz="1867" dirty="0"/>
+            </a:br>
+            <a:endParaRPr lang="en-US" sz="1867" dirty="0"/>
+          </a:p>
+          <a:p>
+            <a:endParaRPr lang="en-US" sz="2133" dirty="0"/>
+          </a:p>
+          <a:p>
+            <a:pPr marL="381003" indent="-381003">
+              <a:buFont typeface="Wingdings" panose="05000000000000000000" pitchFamily="2" charset="2"/>
+              <a:buChar char="ü"/>
+            </a:pPr>
+            <a:endParaRPr lang="LID4096" sz="2133" dirty="0"/>
+          </a:p>
+        </p:txBody>
+      </p:sp>
+    </p:spTree>
+    <p:extLst>
+      <p:ext uri="{BB962C8B-B14F-4D97-AF65-F5344CB8AC3E}">
+        <p14:creationId xmlns:p14="http://schemas.microsoft.com/office/powerpoint/2010/main" val="2055811296"/>
+      </p:ext>
+    </p:extLst>
+  </p:cSld>
+  <p:clrMapOvr>
+    <a:masterClrMapping/>
+  </p:clrMapOvr>
   <mc:AlternateContent xmlns:mc="http://schemas.openxmlformats.org/markup-compatibility/2006">
     <mc:Choice xmlns:p14="http://schemas.microsoft.com/office/powerpoint/2010/main" Requires="p14">
       <p:transition spd="med" p14:dur="700">
@@ -11940,7 +12430,7 @@
 </p:sld>
 </file>
 
-<file path=ppt/slides/slide7.xml><?xml version="1.0" encoding="utf-8"?>
+<file path=ppt/slides/slide8.xml><?xml version="1.0" encoding="utf-8"?>
 <p:sld xmlns:a="http://schemas.openxmlformats.org/drawingml/2006/main" xmlns:r="http://schemas.openxmlformats.org/officeDocument/2006/relationships" xmlns:p="http://schemas.openxmlformats.org/presentationml/2006/main">
   <p:cSld>
     <p:spTree>
@@ -12834,7 +13324,7 @@
 </p:sld>
 </file>
 
-<file path=ppt/slides/slide8.xml><?xml version="1.0" encoding="utf-8"?>
+<file path=ppt/slides/slide9.xml><?xml version="1.0" encoding="utf-8"?>
 <p:sld xmlns:a="http://schemas.openxmlformats.org/drawingml/2006/main" xmlns:r="http://schemas.openxmlformats.org/officeDocument/2006/relationships" xmlns:p="http://schemas.openxmlformats.org/presentationml/2006/main">
   <p:cSld>
     <p:spTree>
@@ -13684,183 +14174,6 @@
     <p:extLst>
       <p:ext uri="{BB962C8B-B14F-4D97-AF65-F5344CB8AC3E}">
         <p14:creationId xmlns:p14="http://schemas.microsoft.com/office/powerpoint/2010/main" val="3013864476"/>
-      </p:ext>
-    </p:extLst>
-  </p:cSld>
-  <p:clrMapOvr>
-    <a:masterClrMapping/>
-  </p:clrMapOvr>
-  <mc:AlternateContent xmlns:mc="http://schemas.openxmlformats.org/markup-compatibility/2006">
-    <mc:Choice xmlns:p14="http://schemas.microsoft.com/office/powerpoint/2010/main" Requires="p14">
-      <p:transition spd="med" p14:dur="700">
-        <p:fade/>
-      </p:transition>
-    </mc:Choice>
-    <mc:Fallback>
-      <p:transition spd="med">
-        <p:fade/>
-      </p:transition>
-    </mc:Fallback>
-  </mc:AlternateContent>
-</p:sld>
-</file>
-
-<file path=ppt/slides/slide9.xml><?xml version="1.0" encoding="utf-8"?>
-<p:sld xmlns:a="http://schemas.openxmlformats.org/drawingml/2006/main" xmlns:r="http://schemas.openxmlformats.org/officeDocument/2006/relationships" xmlns:p="http://schemas.openxmlformats.org/presentationml/2006/main">
-  <p:cSld>
-    <p:spTree>
-      <p:nvGrpSpPr>
-        <p:cNvPr id="1" name=""/>
-        <p:cNvGrpSpPr/>
-        <p:nvPr/>
-      </p:nvGrpSpPr>
-      <p:grpSpPr>
-        <a:xfrm>
-          <a:off x="0" y="0"/>
-          <a:ext cx="0" cy="0"/>
-          <a:chOff x="0" y="0"/>
-          <a:chExt cx="0" cy="0"/>
-        </a:xfrm>
-      </p:grpSpPr>
-      <p:sp>
-        <p:nvSpPr>
-          <p:cNvPr id="15" name="TextBox 14">
-            <a:extLst>
-              <a:ext uri="{FF2B5EF4-FFF2-40B4-BE49-F238E27FC236}">
-                <a16:creationId xmlns:a16="http://schemas.microsoft.com/office/drawing/2014/main" id="{71F8D981-82E6-0AB1-BBBA-08024F125D16}"/>
-              </a:ext>
-            </a:extLst>
-          </p:cNvPr>
-          <p:cNvSpPr txBox="1"/>
-          <p:nvPr/>
-        </p:nvSpPr>
-        <p:spPr>
-          <a:xfrm>
-            <a:off x="402675" y="838780"/>
-            <a:ext cx="6547425" cy="1323439"/>
-          </a:xfrm>
-          <a:prstGeom prst="rect">
-            <a:avLst/>
-          </a:prstGeom>
-          <a:noFill/>
-        </p:spPr>
-        <p:txBody>
-          <a:bodyPr wrap="square" rtlCol="0">
-            <a:spAutoFit/>
-          </a:bodyPr>
-          <a:lstStyle/>
-          <a:p>
-            <a:pPr marL="381003" indent="-381003">
-              <a:buFont typeface="Wingdings" panose="05000000000000000000" pitchFamily="2" charset="2"/>
-              <a:buChar char="ü"/>
-            </a:pPr>
-            <a:r>
-              <a:rPr lang="en-US" sz="1867" dirty="0"/>
-              <a:t>No GPU resource on spider</a:t>
-            </a:r>
-          </a:p>
-          <a:p>
-            <a:pPr marL="381003" indent="-381003">
-              <a:buFont typeface="Wingdings" panose="05000000000000000000" pitchFamily="2" charset="2"/>
-              <a:buChar char="ü"/>
-            </a:pPr>
-            <a:r>
-              <a:rPr lang="en-US" sz="1867" dirty="0"/>
-              <a:t>Send me your GitHub usernames</a:t>
-            </a:r>
-          </a:p>
-          <a:p>
-            <a:endParaRPr lang="en-US" sz="2133" dirty="0"/>
-          </a:p>
-          <a:p>
-            <a:pPr marL="381003" indent="-381003">
-              <a:buFont typeface="Wingdings" panose="05000000000000000000" pitchFamily="2" charset="2"/>
-              <a:buChar char="ü"/>
-            </a:pPr>
-            <a:endParaRPr lang="LID4096" sz="2133" dirty="0"/>
-          </a:p>
-        </p:txBody>
-      </p:sp>
-      <p:sp>
-        <p:nvSpPr>
-          <p:cNvPr id="4" name="Title 1">
-            <a:extLst>
-              <a:ext uri="{FF2B5EF4-FFF2-40B4-BE49-F238E27FC236}">
-                <a16:creationId xmlns:a16="http://schemas.microsoft.com/office/drawing/2014/main" id="{0814C2D1-6846-10C7-29DB-26225B7506D9}"/>
-              </a:ext>
-            </a:extLst>
-          </p:cNvPr>
-          <p:cNvSpPr>
-            <a:spLocks noGrp="1"/>
-          </p:cNvSpPr>
-          <p:nvPr>
-            <p:ph type="title"/>
-          </p:nvPr>
-        </p:nvSpPr>
-        <p:spPr>
-          <a:xfrm>
-            <a:off x="478641" y="15030"/>
-            <a:ext cx="9874044" cy="443000"/>
-          </a:xfrm>
-        </p:spPr>
-        <p:txBody>
-          <a:bodyPr>
-            <a:normAutofit/>
-          </a:bodyPr>
-          <a:lstStyle/>
-          <a:p>
-            <a:r>
-              <a:rPr lang="en-US" sz="1314" b="1" dirty="0">
-                <a:solidFill>
-                  <a:schemeClr val="accent1"/>
-                </a:solidFill>
-                <a:latin typeface="Avenir Next" panose="020B0503020202020204" pitchFamily="34" charset="0"/>
-              </a:rPr>
-              <a:t>Reminder</a:t>
-            </a:r>
-            <a:endParaRPr lang="en-NL" sz="1314" b="1" dirty="0">
-              <a:solidFill>
-                <a:schemeClr val="accent1"/>
-              </a:solidFill>
-              <a:latin typeface="Avenir Next" panose="020B0503020202020204" pitchFamily="34" charset="0"/>
-            </a:endParaRPr>
-          </a:p>
-        </p:txBody>
-      </p:sp>
-      <p:pic>
-        <p:nvPicPr>
-          <p:cNvPr id="5" name="Content Placeholder 5">
-            <a:extLst>
-              <a:ext uri="{FF2B5EF4-FFF2-40B4-BE49-F238E27FC236}">
-                <a16:creationId xmlns:a16="http://schemas.microsoft.com/office/drawing/2014/main" id="{A8C9261E-9AB2-5FC2-1EED-856C6C8F2BF8}"/>
-              </a:ext>
-            </a:extLst>
-          </p:cNvPr>
-          <p:cNvPicPr>
-            <a:picLocks noChangeAspect="1"/>
-          </p:cNvPicPr>
-          <p:nvPr/>
-        </p:nvPicPr>
-        <p:blipFill>
-          <a:blip r:embed="rId2"/>
-          <a:stretch>
-            <a:fillRect/>
-          </a:stretch>
-        </p:blipFill>
-        <p:spPr>
-          <a:xfrm>
-            <a:off x="12179100" y="6320245"/>
-            <a:ext cx="643777" cy="487304"/>
-          </a:xfrm>
-          <a:prstGeom prst="rect">
-            <a:avLst/>
-          </a:prstGeom>
-        </p:spPr>
-      </p:pic>
-    </p:spTree>
-    <p:extLst>
-      <p:ext uri="{BB962C8B-B14F-4D97-AF65-F5344CB8AC3E}">
-        <p14:creationId xmlns:p14="http://schemas.microsoft.com/office/powerpoint/2010/main" val="1187055163"/>
       </p:ext>
     </p:extLst>
   </p:cSld>

</xml_diff>

<commit_message>
slidef for weekly meeting updated
</commit_message>
<xml_diff>
--- a/docs/surf_PiCas_Dec_05.pptx
+++ b/docs/surf_PiCas_Dec_05.pptx
@@ -5,19 +5,20 @@
     <p:sldMasterId id="2147483661" r:id="rId1"/>
   </p:sldMasterIdLst>
   <p:notesMasterIdLst>
-    <p:notesMasterId r:id="rId12"/>
+    <p:notesMasterId r:id="rId13"/>
   </p:notesMasterIdLst>
   <p:sldIdLst>
     <p:sldId id="259" r:id="rId2"/>
     <p:sldId id="591" r:id="rId3"/>
     <p:sldId id="592" r:id="rId4"/>
-    <p:sldId id="593" r:id="rId5"/>
-    <p:sldId id="465" r:id="rId6"/>
-    <p:sldId id="594" r:id="rId7"/>
-    <p:sldId id="597" r:id="rId8"/>
-    <p:sldId id="523" r:id="rId9"/>
-    <p:sldId id="595" r:id="rId10"/>
-    <p:sldId id="571" r:id="rId11"/>
+    <p:sldId id="598" r:id="rId5"/>
+    <p:sldId id="593" r:id="rId6"/>
+    <p:sldId id="465" r:id="rId7"/>
+    <p:sldId id="594" r:id="rId8"/>
+    <p:sldId id="597" r:id="rId9"/>
+    <p:sldId id="523" r:id="rId10"/>
+    <p:sldId id="595" r:id="rId11"/>
+    <p:sldId id="571" r:id="rId12"/>
   </p:sldIdLst>
   <p:sldSz cx="12984163" cy="6858000"/>
   <p:notesSz cx="6858000" cy="9144000"/>
@@ -10595,6 +10596,877 @@
       </p:grpSpPr>
       <p:sp>
         <p:nvSpPr>
+          <p:cNvPr id="6" name="TextBox 5">
+            <a:extLst>
+              <a:ext uri="{FF2B5EF4-FFF2-40B4-BE49-F238E27FC236}">
+                <a16:creationId xmlns:a16="http://schemas.microsoft.com/office/drawing/2014/main" id="{FC12FC0C-6C8F-7413-1D65-C4DE01BC4013}"/>
+              </a:ext>
+            </a:extLst>
+          </p:cNvPr>
+          <p:cNvSpPr txBox="1"/>
+          <p:nvPr/>
+        </p:nvSpPr>
+        <p:spPr>
+          <a:xfrm>
+            <a:off x="853282" y="824754"/>
+            <a:ext cx="8606117" cy="1323439"/>
+          </a:xfrm>
+          <a:prstGeom prst="rect">
+            <a:avLst/>
+          </a:prstGeom>
+          <a:noFill/>
+        </p:spPr>
+        <p:txBody>
+          <a:bodyPr wrap="square" rtlCol="0">
+            <a:spAutoFit/>
+          </a:bodyPr>
+          <a:lstStyle/>
+          <a:p>
+            <a:r>
+              <a:rPr lang="en-US" sz="1600" b="1" dirty="0"/>
+              <a:t>Milestone 1:  Compatibility and shareability </a:t>
+            </a:r>
+          </a:p>
+          <a:p>
+            <a:r>
+              <a:rPr lang="en-US" sz="1600" dirty="0"/>
+              <a:t>Deliverable</a:t>
+            </a:r>
+            <a:r>
+              <a:rPr lang="en-US" sz="1600" b="1" dirty="0"/>
+              <a:t>:</a:t>
+            </a:r>
+          </a:p>
+          <a:p>
+            <a:pPr marL="990607" lvl="1" indent="-381003">
+              <a:buFont typeface="Arial" panose="020B0604020202020204" pitchFamily="34" charset="0"/>
+              <a:buChar char="•"/>
+            </a:pPr>
+            <a:r>
+              <a:rPr lang="en-US" sz="1600" dirty="0"/>
+              <a:t>Prepare images for models (models of computer vision group)</a:t>
+            </a:r>
+          </a:p>
+          <a:p>
+            <a:pPr marL="990607" lvl="1" indent="-381003">
+              <a:buFont typeface="Arial" panose="020B0604020202020204" pitchFamily="34" charset="0"/>
+              <a:buChar char="•"/>
+            </a:pPr>
+            <a:r>
+              <a:rPr lang="en-US" sz="1600" dirty="0"/>
+              <a:t>Short report (Guideline)</a:t>
+            </a:r>
+          </a:p>
+          <a:p>
+            <a:pPr marL="990607" lvl="1" indent="-381003">
+              <a:buFont typeface="Arial" panose="020B0604020202020204" pitchFamily="34" charset="0"/>
+              <a:buChar char="•"/>
+            </a:pPr>
+            <a:r>
+              <a:rPr lang="en-US" sz="1600" b="1" dirty="0"/>
+              <a:t>Deadline</a:t>
+            </a:r>
+            <a:r>
+              <a:rPr lang="en-US" sz="1600" dirty="0"/>
+              <a:t>:  Jan  8</a:t>
+            </a:r>
+          </a:p>
+        </p:txBody>
+      </p:sp>
+      <p:sp>
+        <p:nvSpPr>
+          <p:cNvPr id="7" name="TextBox 6">
+            <a:extLst>
+              <a:ext uri="{FF2B5EF4-FFF2-40B4-BE49-F238E27FC236}">
+                <a16:creationId xmlns:a16="http://schemas.microsoft.com/office/drawing/2014/main" id="{0F16D2B6-A3F1-EAA5-06E4-5E79390D41AA}"/>
+              </a:ext>
+            </a:extLst>
+          </p:cNvPr>
+          <p:cNvSpPr txBox="1"/>
+          <p:nvPr/>
+        </p:nvSpPr>
+        <p:spPr>
+          <a:xfrm>
+            <a:off x="814889" y="2453912"/>
+            <a:ext cx="9352568" cy="1323439"/>
+          </a:xfrm>
+          <a:prstGeom prst="rect">
+            <a:avLst/>
+          </a:prstGeom>
+          <a:noFill/>
+        </p:spPr>
+        <p:txBody>
+          <a:bodyPr wrap="square" rtlCol="0">
+            <a:spAutoFit/>
+          </a:bodyPr>
+          <a:lstStyle/>
+          <a:p>
+            <a:r>
+              <a:rPr lang="en-US" sz="1600" b="1" dirty="0"/>
+              <a:t>Milestone 2:  </a:t>
+            </a:r>
+            <a:r>
+              <a:rPr lang="en-US" sz="1600" b="1" dirty="0" err="1"/>
+              <a:t>PiCas</a:t>
+            </a:r>
+            <a:r>
+              <a:rPr lang="en-US" sz="1600" b="1" dirty="0"/>
+              <a:t> integration</a:t>
+            </a:r>
+          </a:p>
+          <a:p>
+            <a:r>
+              <a:rPr lang="en-US" sz="1600" dirty="0"/>
+              <a:t>Deliverables</a:t>
+            </a:r>
+            <a:r>
+              <a:rPr lang="en-US" sz="1600" b="1" dirty="0"/>
+              <a:t>:</a:t>
+            </a:r>
+          </a:p>
+          <a:p>
+            <a:pPr marL="990607" lvl="1" indent="-381003">
+              <a:buFont typeface="Arial" panose="020B0604020202020204" pitchFamily="34" charset="0"/>
+              <a:buChar char="•"/>
+            </a:pPr>
+            <a:r>
+              <a:rPr lang="en-US" sz="1600" dirty="0"/>
+              <a:t>Prepare different pilot jobs according to user needs</a:t>
+            </a:r>
+          </a:p>
+          <a:p>
+            <a:pPr marL="990607" lvl="1" indent="-381003">
+              <a:buFont typeface="Arial" panose="020B0604020202020204" pitchFamily="34" charset="0"/>
+              <a:buChar char="•"/>
+            </a:pPr>
+            <a:r>
+              <a:rPr lang="en-US" sz="1600" dirty="0"/>
+              <a:t>Automate (partly) pilot job submission</a:t>
+            </a:r>
+          </a:p>
+          <a:p>
+            <a:pPr marL="990607" lvl="1" indent="-381003">
+              <a:buFont typeface="Arial" panose="020B0604020202020204" pitchFamily="34" charset="0"/>
+              <a:buChar char="•"/>
+            </a:pPr>
+            <a:r>
+              <a:rPr lang="en-US" sz="1600" b="1" dirty="0"/>
+              <a:t>Deadline</a:t>
+            </a:r>
+            <a:r>
+              <a:rPr lang="en-US" sz="1600" dirty="0"/>
+              <a:t>:  Jan 30 </a:t>
+            </a:r>
+          </a:p>
+        </p:txBody>
+      </p:sp>
+      <p:sp>
+        <p:nvSpPr>
+          <p:cNvPr id="8" name="TextBox 7">
+            <a:extLst>
+              <a:ext uri="{FF2B5EF4-FFF2-40B4-BE49-F238E27FC236}">
+                <a16:creationId xmlns:a16="http://schemas.microsoft.com/office/drawing/2014/main" id="{91CD3A47-0EB8-625D-9DBF-571A8DFB0B04}"/>
+              </a:ext>
+            </a:extLst>
+          </p:cNvPr>
+          <p:cNvSpPr txBox="1"/>
+          <p:nvPr/>
+        </p:nvSpPr>
+        <p:spPr>
+          <a:xfrm>
+            <a:off x="724368" y="4160825"/>
+            <a:ext cx="8606117" cy="1077218"/>
+          </a:xfrm>
+          <a:prstGeom prst="rect">
+            <a:avLst/>
+          </a:prstGeom>
+          <a:noFill/>
+        </p:spPr>
+        <p:txBody>
+          <a:bodyPr wrap="square" rtlCol="0">
+            <a:spAutoFit/>
+          </a:bodyPr>
+          <a:lstStyle/>
+          <a:p>
+            <a:r>
+              <a:rPr lang="en-US" sz="1600" b="1" dirty="0"/>
+              <a:t>Milestone 3:  Web-application</a:t>
+            </a:r>
+          </a:p>
+          <a:p>
+            <a:r>
+              <a:rPr lang="en-US" sz="1600" dirty="0"/>
+              <a:t>Deliverable</a:t>
+            </a:r>
+            <a:r>
+              <a:rPr lang="en-US" sz="1600" b="1" dirty="0"/>
+              <a:t>:</a:t>
+            </a:r>
+          </a:p>
+          <a:p>
+            <a:pPr marL="990607" lvl="1" indent="-381003">
+              <a:buFont typeface="Arial" panose="020B0604020202020204" pitchFamily="34" charset="0"/>
+              <a:buChar char="•"/>
+            </a:pPr>
+            <a:r>
+              <a:rPr lang="en-US" sz="1600" dirty="0"/>
+              <a:t>Complete remaining tasks </a:t>
+            </a:r>
+          </a:p>
+          <a:p>
+            <a:pPr marL="990607" lvl="1" indent="-381003">
+              <a:buFont typeface="Arial" panose="020B0604020202020204" pitchFamily="34" charset="0"/>
+              <a:buChar char="•"/>
+            </a:pPr>
+            <a:r>
+              <a:rPr lang="en-US" sz="1600" b="1" dirty="0"/>
+              <a:t>Deadline</a:t>
+            </a:r>
+            <a:r>
+              <a:rPr lang="en-US" sz="1600" dirty="0"/>
+              <a:t>:  Feb 15 </a:t>
+            </a:r>
+          </a:p>
+        </p:txBody>
+      </p:sp>
+      <p:graphicFrame>
+        <p:nvGraphicFramePr>
+          <p:cNvPr id="9" name="Diagram 8">
+            <a:extLst>
+              <a:ext uri="{FF2B5EF4-FFF2-40B4-BE49-F238E27FC236}">
+                <a16:creationId xmlns:a16="http://schemas.microsoft.com/office/drawing/2014/main" id="{026BB30E-2595-144D-905F-AF10D6572A09}"/>
+              </a:ext>
+            </a:extLst>
+          </p:cNvPr>
+          <p:cNvGraphicFramePr/>
+          <p:nvPr>
+            <p:extLst>
+              <p:ext uri="{D42A27DB-BD31-4B8C-83A1-F6EECF244321}">
+                <p14:modId xmlns:p14="http://schemas.microsoft.com/office/powerpoint/2010/main" val="418463686"/>
+              </p:ext>
+            </p:extLst>
+          </p:nvPr>
+        </p:nvGraphicFramePr>
+        <p:xfrm>
+          <a:off x="787302" y="6411242"/>
+          <a:ext cx="11401902" cy="232066"/>
+        </p:xfrm>
+        <a:graphic>
+          <a:graphicData uri="http://schemas.openxmlformats.org/drawingml/2006/diagram">
+            <dgm:relIds xmlns:dgm="http://schemas.openxmlformats.org/drawingml/2006/diagram" xmlns:r="http://schemas.openxmlformats.org/officeDocument/2006/relationships" r:dm="rId2" r:lo="rId3" r:qs="rId4" r:cs="rId5"/>
+          </a:graphicData>
+        </a:graphic>
+      </p:graphicFrame>
+      <p:sp>
+        <p:nvSpPr>
+          <p:cNvPr id="10" name="Arrow: Down 9">
+            <a:extLst>
+              <a:ext uri="{FF2B5EF4-FFF2-40B4-BE49-F238E27FC236}">
+                <a16:creationId xmlns:a16="http://schemas.microsoft.com/office/drawing/2014/main" id="{627423EE-9F76-298C-A776-0AF9A7E5E9B4}"/>
+              </a:ext>
+            </a:extLst>
+          </p:cNvPr>
+          <p:cNvSpPr/>
+          <p:nvPr/>
+        </p:nvSpPr>
+        <p:spPr>
+          <a:xfrm>
+            <a:off x="9799354" y="6156717"/>
+            <a:ext cx="130469" cy="253006"/>
+          </a:xfrm>
+          <a:prstGeom prst="downArrow">
+            <a:avLst/>
+          </a:prstGeom>
+        </p:spPr>
+        <p:style>
+          <a:lnRef idx="2">
+            <a:schemeClr val="accent1">
+              <a:shade val="50000"/>
+            </a:schemeClr>
+          </a:lnRef>
+          <a:fillRef idx="1">
+            <a:schemeClr val="accent1"/>
+          </a:fillRef>
+          <a:effectRef idx="0">
+            <a:schemeClr val="accent1"/>
+          </a:effectRef>
+          <a:fontRef idx="minor">
+            <a:schemeClr val="lt1"/>
+          </a:fontRef>
+        </p:style>
+        <p:txBody>
+          <a:bodyPr rtlCol="0" anchor="ctr"/>
+          <a:lstStyle/>
+          <a:p>
+            <a:pPr algn="ctr"/>
+            <a:endParaRPr lang="LID4096" sz="2842"/>
+          </a:p>
+        </p:txBody>
+      </p:sp>
+      <p:sp>
+        <p:nvSpPr>
+          <p:cNvPr id="11" name="TextBox 10">
+            <a:extLst>
+              <a:ext uri="{FF2B5EF4-FFF2-40B4-BE49-F238E27FC236}">
+                <a16:creationId xmlns:a16="http://schemas.microsoft.com/office/drawing/2014/main" id="{8BFAAACE-7346-702F-3590-5FC74D6DAED9}"/>
+              </a:ext>
+            </a:extLst>
+          </p:cNvPr>
+          <p:cNvSpPr txBox="1"/>
+          <p:nvPr/>
+        </p:nvSpPr>
+        <p:spPr>
+          <a:xfrm>
+            <a:off x="8541949" y="5792588"/>
+            <a:ext cx="901695" cy="256352"/>
+          </a:xfrm>
+          <a:prstGeom prst="rect">
+            <a:avLst/>
+          </a:prstGeom>
+          <a:noFill/>
+        </p:spPr>
+        <p:txBody>
+          <a:bodyPr wrap="square" rtlCol="0">
+            <a:spAutoFit/>
+          </a:bodyPr>
+          <a:lstStyle/>
+          <a:p>
+            <a:r>
+              <a:rPr lang="en-US" sz="1066" b="1" dirty="0"/>
+              <a:t>Milestone 3</a:t>
+            </a:r>
+          </a:p>
+        </p:txBody>
+      </p:sp>
+      <p:sp>
+        <p:nvSpPr>
+          <p:cNvPr id="12" name="Arrow: Down 11">
+            <a:extLst>
+              <a:ext uri="{FF2B5EF4-FFF2-40B4-BE49-F238E27FC236}">
+                <a16:creationId xmlns:a16="http://schemas.microsoft.com/office/drawing/2014/main" id="{02E116A1-004A-5085-69AB-6723D3131ACE}"/>
+              </a:ext>
+            </a:extLst>
+          </p:cNvPr>
+          <p:cNvSpPr/>
+          <p:nvPr/>
+        </p:nvSpPr>
+        <p:spPr>
+          <a:xfrm>
+            <a:off x="7942852" y="6148534"/>
+            <a:ext cx="103282" cy="253006"/>
+          </a:xfrm>
+          <a:prstGeom prst="downArrow">
+            <a:avLst/>
+          </a:prstGeom>
+        </p:spPr>
+        <p:style>
+          <a:lnRef idx="2">
+            <a:schemeClr val="accent1">
+              <a:shade val="50000"/>
+            </a:schemeClr>
+          </a:lnRef>
+          <a:fillRef idx="1">
+            <a:schemeClr val="accent1"/>
+          </a:fillRef>
+          <a:effectRef idx="0">
+            <a:schemeClr val="accent1"/>
+          </a:effectRef>
+          <a:fontRef idx="minor">
+            <a:schemeClr val="lt1"/>
+          </a:fontRef>
+        </p:style>
+        <p:txBody>
+          <a:bodyPr rtlCol="0" anchor="ctr"/>
+          <a:lstStyle/>
+          <a:p>
+            <a:pPr algn="ctr"/>
+            <a:endParaRPr lang="LID4096" sz="2842"/>
+          </a:p>
+        </p:txBody>
+      </p:sp>
+      <p:sp>
+        <p:nvSpPr>
+          <p:cNvPr id="13" name="Arrow: Down 12">
+            <a:extLst>
+              <a:ext uri="{FF2B5EF4-FFF2-40B4-BE49-F238E27FC236}">
+                <a16:creationId xmlns:a16="http://schemas.microsoft.com/office/drawing/2014/main" id="{ADEDC7DD-729B-7594-E5F0-973D1268DA2C}"/>
+              </a:ext>
+            </a:extLst>
+          </p:cNvPr>
+          <p:cNvSpPr/>
+          <p:nvPr/>
+        </p:nvSpPr>
+        <p:spPr>
+          <a:xfrm>
+            <a:off x="11468540" y="6145157"/>
+            <a:ext cx="130469" cy="259732"/>
+          </a:xfrm>
+          <a:prstGeom prst="downArrow">
+            <a:avLst/>
+          </a:prstGeom>
+        </p:spPr>
+        <p:style>
+          <a:lnRef idx="2">
+            <a:schemeClr val="accent1">
+              <a:shade val="50000"/>
+            </a:schemeClr>
+          </a:lnRef>
+          <a:fillRef idx="1">
+            <a:schemeClr val="accent1"/>
+          </a:fillRef>
+          <a:effectRef idx="0">
+            <a:schemeClr val="accent1"/>
+          </a:effectRef>
+          <a:fontRef idx="minor">
+            <a:schemeClr val="lt1"/>
+          </a:fontRef>
+        </p:style>
+        <p:txBody>
+          <a:bodyPr rtlCol="0" anchor="ctr"/>
+          <a:lstStyle/>
+          <a:p>
+            <a:pPr algn="ctr"/>
+            <a:endParaRPr lang="LID4096" sz="2842" dirty="0"/>
+          </a:p>
+        </p:txBody>
+      </p:sp>
+      <p:sp>
+        <p:nvSpPr>
+          <p:cNvPr id="14" name="Arrow: Down 13">
+            <a:extLst>
+              <a:ext uri="{FF2B5EF4-FFF2-40B4-BE49-F238E27FC236}">
+                <a16:creationId xmlns:a16="http://schemas.microsoft.com/office/drawing/2014/main" id="{CC5682FB-57D2-9990-DED1-DC9A3A54DB7B}"/>
+              </a:ext>
+            </a:extLst>
+          </p:cNvPr>
+          <p:cNvSpPr/>
+          <p:nvPr/>
+        </p:nvSpPr>
+        <p:spPr>
+          <a:xfrm>
+            <a:off x="8939660" y="6145157"/>
+            <a:ext cx="130471" cy="253006"/>
+          </a:xfrm>
+          <a:prstGeom prst="downArrow">
+            <a:avLst/>
+          </a:prstGeom>
+        </p:spPr>
+        <p:style>
+          <a:lnRef idx="2">
+            <a:schemeClr val="accent1">
+              <a:shade val="50000"/>
+            </a:schemeClr>
+          </a:lnRef>
+          <a:fillRef idx="1">
+            <a:schemeClr val="accent1"/>
+          </a:fillRef>
+          <a:effectRef idx="0">
+            <a:schemeClr val="accent1"/>
+          </a:effectRef>
+          <a:fontRef idx="minor">
+            <a:schemeClr val="lt1"/>
+          </a:fontRef>
+        </p:style>
+        <p:txBody>
+          <a:bodyPr rtlCol="0" anchor="ctr"/>
+          <a:lstStyle/>
+          <a:p>
+            <a:pPr algn="ctr"/>
+            <a:endParaRPr lang="LID4096" sz="2842"/>
+          </a:p>
+        </p:txBody>
+      </p:sp>
+      <p:sp>
+        <p:nvSpPr>
+          <p:cNvPr id="15" name="Arrow: Down 14">
+            <a:extLst>
+              <a:ext uri="{FF2B5EF4-FFF2-40B4-BE49-F238E27FC236}">
+                <a16:creationId xmlns:a16="http://schemas.microsoft.com/office/drawing/2014/main" id="{38128599-CFAC-71B8-0953-CEBAB0C4194A}"/>
+              </a:ext>
+            </a:extLst>
+          </p:cNvPr>
+          <p:cNvSpPr/>
+          <p:nvPr/>
+        </p:nvSpPr>
+        <p:spPr>
+          <a:xfrm>
+            <a:off x="3826135" y="6124883"/>
+            <a:ext cx="130469" cy="284840"/>
+          </a:xfrm>
+          <a:prstGeom prst="downArrow">
+            <a:avLst/>
+          </a:prstGeom>
+        </p:spPr>
+        <p:style>
+          <a:lnRef idx="2">
+            <a:schemeClr val="accent1">
+              <a:shade val="50000"/>
+            </a:schemeClr>
+          </a:lnRef>
+          <a:fillRef idx="1">
+            <a:schemeClr val="accent1"/>
+          </a:fillRef>
+          <a:effectRef idx="0">
+            <a:schemeClr val="accent1"/>
+          </a:effectRef>
+          <a:fontRef idx="minor">
+            <a:schemeClr val="lt1"/>
+          </a:fontRef>
+        </p:style>
+        <p:txBody>
+          <a:bodyPr rtlCol="0" anchor="ctr"/>
+          <a:lstStyle/>
+          <a:p>
+            <a:pPr algn="ctr"/>
+            <a:endParaRPr lang="LID4096" sz="2842" dirty="0"/>
+          </a:p>
+        </p:txBody>
+      </p:sp>
+      <p:sp>
+        <p:nvSpPr>
+          <p:cNvPr id="16" name="TextBox 15">
+            <a:extLst>
+              <a:ext uri="{FF2B5EF4-FFF2-40B4-BE49-F238E27FC236}">
+                <a16:creationId xmlns:a16="http://schemas.microsoft.com/office/drawing/2014/main" id="{0C454734-DA28-DAFB-0320-8DF036A5FBCA}"/>
+              </a:ext>
+            </a:extLst>
+          </p:cNvPr>
+          <p:cNvSpPr txBox="1"/>
+          <p:nvPr/>
+        </p:nvSpPr>
+        <p:spPr>
+          <a:xfrm>
+            <a:off x="7482029" y="5792588"/>
+            <a:ext cx="1116197" cy="256352"/>
+          </a:xfrm>
+          <a:prstGeom prst="rect">
+            <a:avLst/>
+          </a:prstGeom>
+          <a:noFill/>
+        </p:spPr>
+        <p:txBody>
+          <a:bodyPr wrap="square" rtlCol="0">
+            <a:spAutoFit/>
+          </a:bodyPr>
+          <a:lstStyle/>
+          <a:p>
+            <a:r>
+              <a:rPr lang="en-US" sz="1066" b="1" dirty="0"/>
+              <a:t>Milestone 2</a:t>
+            </a:r>
+          </a:p>
+        </p:txBody>
+      </p:sp>
+      <p:sp>
+        <p:nvSpPr>
+          <p:cNvPr id="17" name="TextBox 16">
+            <a:extLst>
+              <a:ext uri="{FF2B5EF4-FFF2-40B4-BE49-F238E27FC236}">
+                <a16:creationId xmlns:a16="http://schemas.microsoft.com/office/drawing/2014/main" id="{2CB85634-327C-AD4A-5514-A00BC1EC5B32}"/>
+              </a:ext>
+            </a:extLst>
+          </p:cNvPr>
+          <p:cNvSpPr txBox="1"/>
+          <p:nvPr/>
+        </p:nvSpPr>
+        <p:spPr>
+          <a:xfrm>
+            <a:off x="11073006" y="5615387"/>
+            <a:ext cx="2232395" cy="420371"/>
+          </a:xfrm>
+          <a:prstGeom prst="rect">
+            <a:avLst/>
+          </a:prstGeom>
+          <a:noFill/>
+        </p:spPr>
+        <p:txBody>
+          <a:bodyPr wrap="square" rtlCol="0">
+            <a:spAutoFit/>
+          </a:bodyPr>
+          <a:lstStyle/>
+          <a:p>
+            <a:r>
+              <a:rPr lang="en-US" sz="1066" b="1" dirty="0"/>
+              <a:t>Defense and </a:t>
+            </a:r>
+          </a:p>
+          <a:p>
+            <a:r>
+              <a:rPr lang="en-US" sz="1066" b="1" dirty="0"/>
+              <a:t>final presentation</a:t>
+            </a:r>
+            <a:endParaRPr lang="LID4096" sz="1066" b="1" dirty="0"/>
+          </a:p>
+        </p:txBody>
+      </p:sp>
+      <p:sp>
+        <p:nvSpPr>
+          <p:cNvPr id="18" name="TextBox 17">
+            <a:extLst>
+              <a:ext uri="{FF2B5EF4-FFF2-40B4-BE49-F238E27FC236}">
+                <a16:creationId xmlns:a16="http://schemas.microsoft.com/office/drawing/2014/main" id="{330DBA8E-B834-78E2-73E0-75ACD2A4DE25}"/>
+              </a:ext>
+            </a:extLst>
+          </p:cNvPr>
+          <p:cNvSpPr txBox="1"/>
+          <p:nvPr/>
+        </p:nvSpPr>
+        <p:spPr>
+          <a:xfrm>
+            <a:off x="9495588" y="5808998"/>
+            <a:ext cx="2232395" cy="256352"/>
+          </a:xfrm>
+          <a:prstGeom prst="rect">
+            <a:avLst/>
+          </a:prstGeom>
+          <a:noFill/>
+        </p:spPr>
+        <p:txBody>
+          <a:bodyPr wrap="square" rtlCol="0">
+            <a:spAutoFit/>
+          </a:bodyPr>
+          <a:lstStyle/>
+          <a:p>
+            <a:r>
+              <a:rPr lang="en-US" sz="1066" dirty="0">
+                <a:solidFill>
+                  <a:srgbClr val="0070C0"/>
+                </a:solidFill>
+              </a:rPr>
+              <a:t>Second draft(thesis)</a:t>
+            </a:r>
+            <a:endParaRPr lang="LID4096" sz="1066" dirty="0">
+              <a:solidFill>
+                <a:srgbClr val="0070C0"/>
+              </a:solidFill>
+            </a:endParaRPr>
+          </a:p>
+        </p:txBody>
+      </p:sp>
+      <p:sp>
+        <p:nvSpPr>
+          <p:cNvPr id="19" name="TextBox 18">
+            <a:extLst>
+              <a:ext uri="{FF2B5EF4-FFF2-40B4-BE49-F238E27FC236}">
+                <a16:creationId xmlns:a16="http://schemas.microsoft.com/office/drawing/2014/main" id="{E3274675-14E8-5124-8477-E6FEA1BBFF58}"/>
+              </a:ext>
+            </a:extLst>
+          </p:cNvPr>
+          <p:cNvSpPr txBox="1"/>
+          <p:nvPr/>
+        </p:nvSpPr>
+        <p:spPr>
+          <a:xfrm>
+            <a:off x="3441605" y="5831176"/>
+            <a:ext cx="2232395" cy="256352"/>
+          </a:xfrm>
+          <a:prstGeom prst="rect">
+            <a:avLst/>
+          </a:prstGeom>
+          <a:noFill/>
+        </p:spPr>
+        <p:txBody>
+          <a:bodyPr wrap="square" rtlCol="0">
+            <a:spAutoFit/>
+          </a:bodyPr>
+          <a:lstStyle/>
+          <a:p>
+            <a:r>
+              <a:rPr lang="en-US" sz="1066" dirty="0">
+                <a:solidFill>
+                  <a:srgbClr val="0070C0"/>
+                </a:solidFill>
+              </a:rPr>
+              <a:t>Initial draft(thesis)</a:t>
+            </a:r>
+            <a:endParaRPr lang="LID4096" sz="1066" dirty="0">
+              <a:solidFill>
+                <a:srgbClr val="0070C0"/>
+              </a:solidFill>
+            </a:endParaRPr>
+          </a:p>
+        </p:txBody>
+      </p:sp>
+      <p:sp>
+        <p:nvSpPr>
+          <p:cNvPr id="20" name="Arrow: Down 19">
+            <a:extLst>
+              <a:ext uri="{FF2B5EF4-FFF2-40B4-BE49-F238E27FC236}">
+                <a16:creationId xmlns:a16="http://schemas.microsoft.com/office/drawing/2014/main" id="{F2E9A6BA-B50A-D2F1-3FE9-E7908C35FD16}"/>
+              </a:ext>
+            </a:extLst>
+          </p:cNvPr>
+          <p:cNvSpPr/>
+          <p:nvPr/>
+        </p:nvSpPr>
+        <p:spPr>
+          <a:xfrm>
+            <a:off x="6541255" y="6133885"/>
+            <a:ext cx="130469" cy="253006"/>
+          </a:xfrm>
+          <a:prstGeom prst="downArrow">
+            <a:avLst/>
+          </a:prstGeom>
+        </p:spPr>
+        <p:style>
+          <a:lnRef idx="2">
+            <a:schemeClr val="accent1">
+              <a:shade val="50000"/>
+            </a:schemeClr>
+          </a:lnRef>
+          <a:fillRef idx="1">
+            <a:schemeClr val="accent1"/>
+          </a:fillRef>
+          <a:effectRef idx="0">
+            <a:schemeClr val="accent1"/>
+          </a:effectRef>
+          <a:fontRef idx="minor">
+            <a:schemeClr val="lt1"/>
+          </a:fontRef>
+        </p:style>
+        <p:txBody>
+          <a:bodyPr rtlCol="0" anchor="ctr"/>
+          <a:lstStyle/>
+          <a:p>
+            <a:pPr algn="ctr"/>
+            <a:endParaRPr lang="LID4096" sz="2842"/>
+          </a:p>
+        </p:txBody>
+      </p:sp>
+      <p:sp>
+        <p:nvSpPr>
+          <p:cNvPr id="21" name="TextBox 20">
+            <a:extLst>
+              <a:ext uri="{FF2B5EF4-FFF2-40B4-BE49-F238E27FC236}">
+                <a16:creationId xmlns:a16="http://schemas.microsoft.com/office/drawing/2014/main" id="{04D5EF8D-18E3-125E-E387-41311016932D}"/>
+              </a:ext>
+            </a:extLst>
+          </p:cNvPr>
+          <p:cNvSpPr txBox="1"/>
+          <p:nvPr/>
+        </p:nvSpPr>
+        <p:spPr>
+          <a:xfrm>
+            <a:off x="6135221" y="5799376"/>
+            <a:ext cx="2232395" cy="256352"/>
+          </a:xfrm>
+          <a:prstGeom prst="rect">
+            <a:avLst/>
+          </a:prstGeom>
+          <a:noFill/>
+        </p:spPr>
+        <p:txBody>
+          <a:bodyPr wrap="square" rtlCol="0">
+            <a:spAutoFit/>
+          </a:bodyPr>
+          <a:lstStyle/>
+          <a:p>
+            <a:r>
+              <a:rPr lang="en-US" sz="1066" b="1" dirty="0"/>
+              <a:t>Milestone 1</a:t>
+            </a:r>
+          </a:p>
+        </p:txBody>
+      </p:sp>
+      <p:sp>
+        <p:nvSpPr>
+          <p:cNvPr id="5" name="Title 1">
+            <a:extLst>
+              <a:ext uri="{FF2B5EF4-FFF2-40B4-BE49-F238E27FC236}">
+                <a16:creationId xmlns:a16="http://schemas.microsoft.com/office/drawing/2014/main" id="{AF136E46-224C-3612-21AF-8F58BE935AB3}"/>
+              </a:ext>
+            </a:extLst>
+          </p:cNvPr>
+          <p:cNvSpPr>
+            <a:spLocks noGrp="1"/>
+          </p:cNvSpPr>
+          <p:nvPr>
+            <p:ph type="title"/>
+          </p:nvPr>
+        </p:nvSpPr>
+        <p:spPr>
+          <a:xfrm>
+            <a:off x="478641" y="15030"/>
+            <a:ext cx="9874044" cy="443000"/>
+          </a:xfrm>
+        </p:spPr>
+        <p:txBody>
+          <a:bodyPr>
+            <a:normAutofit/>
+          </a:bodyPr>
+          <a:lstStyle/>
+          <a:p>
+            <a:r>
+              <a:rPr lang="en-US" sz="1314" b="1" dirty="0">
+                <a:solidFill>
+                  <a:schemeClr val="accent1"/>
+                </a:solidFill>
+                <a:latin typeface="Avenir Next" panose="020B0503020202020204" pitchFamily="34" charset="0"/>
+              </a:rPr>
+              <a:t>Project Plan and Milestones </a:t>
+            </a:r>
+            <a:r>
+              <a:rPr lang="en-US" sz="1314" b="1" dirty="0">
+                <a:solidFill>
+                  <a:srgbClr val="FF0000"/>
+                </a:solidFill>
+                <a:latin typeface="Avenir Next" panose="020B0503020202020204" pitchFamily="34" charset="0"/>
+              </a:rPr>
+              <a:t>(updated)</a:t>
+            </a:r>
+            <a:endParaRPr lang="en-NL" sz="1314" b="1" dirty="0">
+              <a:solidFill>
+                <a:srgbClr val="FF0000"/>
+              </a:solidFill>
+              <a:latin typeface="Avenir Next" panose="020B0503020202020204" pitchFamily="34" charset="0"/>
+            </a:endParaRPr>
+          </a:p>
+        </p:txBody>
+      </p:sp>
+    </p:spTree>
+    <p:extLst>
+      <p:ext uri="{BB962C8B-B14F-4D97-AF65-F5344CB8AC3E}">
+        <p14:creationId xmlns:p14="http://schemas.microsoft.com/office/powerpoint/2010/main" val="3013864476"/>
+      </p:ext>
+    </p:extLst>
+  </p:cSld>
+  <p:clrMapOvr>
+    <a:masterClrMapping/>
+  </p:clrMapOvr>
+  <mc:AlternateContent xmlns:mc="http://schemas.openxmlformats.org/markup-compatibility/2006" xmlns:p14="http://schemas.microsoft.com/office/powerpoint/2010/main">
+    <mc:Choice Requires="p14">
+      <p:transition spd="med" p14:dur="700">
+        <p:fade/>
+      </p:transition>
+    </mc:Choice>
+    <mc:Fallback xmlns="">
+      <p:transition spd="med">
+        <p:fade/>
+      </p:transition>
+    </mc:Fallback>
+  </mc:AlternateContent>
+</p:sld>
+</file>
+
+<file path=ppt/slides/slide11.xml><?xml version="1.0" encoding="utf-8"?>
+<p:sld xmlns:a="http://schemas.openxmlformats.org/drawingml/2006/main" xmlns:r="http://schemas.openxmlformats.org/officeDocument/2006/relationships" xmlns:p="http://schemas.openxmlformats.org/presentationml/2006/main">
+  <p:cSld>
+    <p:spTree>
+      <p:nvGrpSpPr>
+        <p:cNvPr id="1" name=""/>
+        <p:cNvGrpSpPr/>
+        <p:nvPr/>
+      </p:nvGrpSpPr>
+      <p:grpSpPr>
+        <a:xfrm>
+          <a:off x="0" y="0"/>
+          <a:ext cx="0" cy="0"/>
+          <a:chOff x="0" y="0"/>
+          <a:chExt cx="0" cy="0"/>
+        </a:xfrm>
+      </p:grpSpPr>
+      <p:sp>
+        <p:nvSpPr>
           <p:cNvPr id="15" name="TextBox 14">
             <a:extLst>
               <a:ext uri="{FF2B5EF4-FFF2-40B4-BE49-F238E27FC236}">
@@ -11237,42 +12109,6 @@
       </p:grpSpPr>
       <p:pic>
         <p:nvPicPr>
-          <p:cNvPr id="59" name="Picture 58" descr="A diagram of a project&#10;&#10;Description automatically generated">
-            <a:extLst>
-              <a:ext uri="{FF2B5EF4-FFF2-40B4-BE49-F238E27FC236}">
-                <a16:creationId xmlns:a16="http://schemas.microsoft.com/office/drawing/2014/main" id="{EBF968B3-BE24-871C-726F-6E857EEF0F8D}"/>
-              </a:ext>
-            </a:extLst>
-          </p:cNvPr>
-          <p:cNvPicPr>
-            <a:picLocks noChangeAspect="1"/>
-          </p:cNvPicPr>
-          <p:nvPr/>
-        </p:nvPicPr>
-        <p:blipFill>
-          <a:blip r:embed="rId2">
-            <a:extLst>
-              <a:ext uri="{28A0092B-C50C-407E-A947-70E740481C1C}">
-                <a14:useLocalDpi xmlns:a14="http://schemas.microsoft.com/office/drawing/2010/main" val="0"/>
-              </a:ext>
-            </a:extLst>
-          </a:blip>
-          <a:stretch>
-            <a:fillRect/>
-          </a:stretch>
-        </p:blipFill>
-        <p:spPr>
-          <a:xfrm>
-            <a:off x="260377" y="458030"/>
-            <a:ext cx="10310571" cy="6007482"/>
-          </a:xfrm>
-          <a:prstGeom prst="rect">
-            <a:avLst/>
-          </a:prstGeom>
-        </p:spPr>
-      </p:pic>
-      <p:pic>
-        <p:nvPicPr>
           <p:cNvPr id="5" name="Content Placeholder 5">
             <a:extLst>
               <a:ext uri="{FF2B5EF4-FFF2-40B4-BE49-F238E27FC236}">
@@ -11286,7 +12122,7 @@
           <p:nvPr/>
         </p:nvPicPr>
         <p:blipFill>
-          <a:blip r:embed="rId3"/>
+          <a:blip r:embed="rId2"/>
           <a:stretch>
             <a:fillRect/>
           </a:stretch>
@@ -11336,7 +12172,70 @@
                 </a:solidFill>
                 <a:latin typeface="Avenir Next" panose="020B0503020202020204" pitchFamily="34" charset="0"/>
               </a:rPr>
-              <a:t>Progress update:  Work breakdown structure (WBS)</a:t>
+              <a:t>Progress update: </a:t>
+            </a:r>
+            <a:r>
+              <a:rPr lang="en-US" sz="1400" dirty="0">
+                <a:solidFill>
+                  <a:schemeClr val="accent1"/>
+                </a:solidFill>
+                <a:latin typeface="Avenir Next" panose="020B0503020202020204" pitchFamily="34" charset="0"/>
+              </a:rPr>
+              <a:t> Access to files and </a:t>
+            </a:r>
+            <a:r>
+              <a:rPr lang="en-US" sz="1400" dirty="0" err="1">
+                <a:solidFill>
+                  <a:schemeClr val="accent1"/>
+                </a:solidFill>
+                <a:latin typeface="Avenir Next" panose="020B0503020202020204" pitchFamily="34" charset="0"/>
+              </a:rPr>
+              <a:t>dir</a:t>
+            </a:r>
+            <a:r>
+              <a:rPr lang="en-US" sz="1400" dirty="0">
+                <a:solidFill>
+                  <a:schemeClr val="accent1"/>
+                </a:solidFill>
+                <a:latin typeface="Avenir Next" panose="020B0503020202020204" pitchFamily="34" charset="0"/>
+              </a:rPr>
+              <a:t> in </a:t>
+            </a:r>
+            <a:r>
+              <a:rPr lang="en-US" sz="1400" dirty="0" err="1">
+                <a:solidFill>
+                  <a:schemeClr val="accent1"/>
+                </a:solidFill>
+                <a:latin typeface="Avenir Next" panose="020B0503020202020204" pitchFamily="34" charset="0"/>
+              </a:rPr>
+              <a:t>dCache</a:t>
+            </a:r>
+            <a:r>
+              <a:rPr lang="en-US" sz="1400" dirty="0">
+                <a:solidFill>
+                  <a:schemeClr val="accent1"/>
+                </a:solidFill>
+                <a:latin typeface="Avenir Next" panose="020B0503020202020204" pitchFamily="34" charset="0"/>
+              </a:rPr>
+              <a:t> using </a:t>
+            </a:r>
+            <a:r>
+              <a:rPr lang="en-US" sz="1400" dirty="0" err="1">
+                <a:solidFill>
+                  <a:schemeClr val="accent1"/>
+                </a:solidFill>
+                <a:latin typeface="Avenir Next" panose="020B0503020202020204" pitchFamily="34" charset="0"/>
+              </a:rPr>
+              <a:t>ada</a:t>
+            </a:r>
+            <a:r>
+              <a:rPr lang="en-US" sz="1400" dirty="0">
+                <a:solidFill>
+                  <a:schemeClr val="accent1"/>
+                </a:solidFill>
+                <a:latin typeface="Avenir Next" panose="020B0503020202020204" pitchFamily="34" charset="0"/>
+              </a:rPr>
+              <a:t> and macaroon</a:t>
             </a:r>
             <a:endParaRPr lang="en-NL" sz="1314" b="1" dirty="0">
               <a:solidFill>
@@ -11347,23 +12246,454 @@
           </a:p>
         </p:txBody>
       </p:sp>
+      <p:sp>
+        <p:nvSpPr>
+          <p:cNvPr id="3" name="TextBox 2">
+            <a:extLst>
+              <a:ext uri="{FF2B5EF4-FFF2-40B4-BE49-F238E27FC236}">
+                <a16:creationId xmlns:a16="http://schemas.microsoft.com/office/drawing/2014/main" id="{0A936FAE-FE86-511C-B34E-E915E044A8E9}"/>
+              </a:ext>
+            </a:extLst>
+          </p:cNvPr>
+          <p:cNvSpPr txBox="1"/>
+          <p:nvPr/>
+        </p:nvSpPr>
+        <p:spPr>
+          <a:xfrm>
+            <a:off x="522583" y="6545939"/>
+            <a:ext cx="6920176" cy="523220"/>
+          </a:xfrm>
+          <a:prstGeom prst="rect">
+            <a:avLst/>
+          </a:prstGeom>
+          <a:noFill/>
+        </p:spPr>
+        <p:txBody>
+          <a:bodyPr wrap="square" rtlCol="0">
+            <a:spAutoFit/>
+          </a:bodyPr>
+          <a:lstStyle/>
+          <a:p>
+            <a:r>
+              <a:rPr lang="en-US" sz="1000" dirty="0"/>
+              <a:t>Implementation:   On GitHub -  </a:t>
+            </a:r>
+            <a:r>
+              <a:rPr lang="en-US" sz="1000" b="1" u="none" strike="noStrike" dirty="0">
+                <a:solidFill>
+                  <a:schemeClr val="accent2"/>
+                </a:solidFill>
+                <a:effectLst/>
+                <a:hlinkClick r:id="rId3">
+                  <a:extLst>
+                    <a:ext uri="{A12FA001-AC4F-418D-AE19-62706E023703}">
+                      <ahyp:hlinkClr xmlns:ahyp="http://schemas.microsoft.com/office/drawing/2018/hyperlinkcolor" val="tx"/>
+                    </a:ext>
+                  </a:extLst>
+                </a:hlinkClick>
+              </a:rPr>
+              <a:t>IMAGEN_Backend</a:t>
+            </a:r>
+            <a:r>
+              <a:rPr lang="en-US" sz="1000" b="0" dirty="0">
+                <a:solidFill>
+                  <a:schemeClr val="accent2"/>
+                </a:solidFill>
+                <a:effectLst/>
+              </a:rPr>
+              <a:t>/</a:t>
+            </a:r>
+            <a:r>
+              <a:rPr lang="en-US" sz="1000" b="0" u="none" strike="noStrike" dirty="0">
+                <a:solidFill>
+                  <a:schemeClr val="accent2"/>
+                </a:solidFill>
+                <a:effectLst/>
+                <a:hlinkClick r:id="rId4">
+                  <a:extLst>
+                    <a:ext uri="{A12FA001-AC4F-418D-AE19-62706E023703}">
+                      <ahyp:hlinkClr xmlns:ahyp="http://schemas.microsoft.com/office/drawing/2018/hyperlinkcolor" val="tx"/>
+                    </a:ext>
+                  </a:extLst>
+                </a:hlinkClick>
+              </a:rPr>
+              <a:t>picas_client</a:t>
+            </a:r>
+            <a:r>
+              <a:rPr lang="en-US" sz="1000" b="0" i="0" dirty="0">
+                <a:solidFill>
+                  <a:schemeClr val="accent2"/>
+                </a:solidFill>
+                <a:effectLst/>
+              </a:rPr>
+              <a:t>/scripts/data_archival.py</a:t>
+            </a:r>
+            <a:endParaRPr lang="en-US" sz="1000" b="1" i="0" dirty="0">
+              <a:solidFill>
+                <a:schemeClr val="accent2"/>
+              </a:solidFill>
+              <a:effectLst/>
+            </a:endParaRPr>
+          </a:p>
+          <a:p>
+            <a:r>
+              <a:rPr lang="en-US" dirty="0"/>
+              <a:t> </a:t>
+            </a:r>
+            <a:endParaRPr lang="LID4096" dirty="0"/>
+          </a:p>
+        </p:txBody>
+      </p:sp>
+      <p:pic>
+        <p:nvPicPr>
+          <p:cNvPr id="1026" name="Picture 2" descr="@dCache">
+            <a:extLst>
+              <a:ext uri="{FF2B5EF4-FFF2-40B4-BE49-F238E27FC236}">
+                <a16:creationId xmlns:a16="http://schemas.microsoft.com/office/drawing/2014/main" id="{6C3AC7DB-0624-49D1-8D40-C8B5276B7409}"/>
+              </a:ext>
+            </a:extLst>
+          </p:cNvPr>
+          <p:cNvPicPr>
+            <a:picLocks noChangeAspect="1" noChangeArrowheads="1"/>
+          </p:cNvPicPr>
+          <p:nvPr/>
+        </p:nvPicPr>
+        <p:blipFill>
+          <a:blip r:embed="rId5">
+            <a:extLst>
+              <a:ext uri="{28A0092B-C50C-407E-A947-70E740481C1C}">
+                <a14:useLocalDpi xmlns:a14="http://schemas.microsoft.com/office/drawing/2010/main" val="0"/>
+              </a:ext>
+            </a:extLst>
+          </a:blip>
+          <a:srcRect/>
+          <a:stretch>
+            <a:fillRect/>
+          </a:stretch>
+        </p:blipFill>
+        <p:spPr bwMode="auto">
+          <a:xfrm>
+            <a:off x="8866828" y="806654"/>
+            <a:ext cx="390219" cy="390219"/>
+          </a:xfrm>
+          <a:prstGeom prst="rect">
+            <a:avLst/>
+          </a:prstGeom>
+          <a:noFill/>
+          <a:extLst>
+            <a:ext uri="{909E8E84-426E-40DD-AFC4-6F175D3DCCD1}">
+              <a14:hiddenFill xmlns:a14="http://schemas.microsoft.com/office/drawing/2010/main">
+                <a:solidFill>
+                  <a:srgbClr val="FFFFFF"/>
+                </a:solidFill>
+              </a14:hiddenFill>
+            </a:ext>
+          </a:extLst>
+        </p:spPr>
+      </p:pic>
+      <p:pic>
+        <p:nvPicPr>
+          <p:cNvPr id="1028" name="Picture 4">
+            <a:extLst>
+              <a:ext uri="{FF2B5EF4-FFF2-40B4-BE49-F238E27FC236}">
+                <a16:creationId xmlns:a16="http://schemas.microsoft.com/office/drawing/2014/main" id="{A15D637A-8988-5793-1E5B-66211EE47B46}"/>
+              </a:ext>
+            </a:extLst>
+          </p:cNvPr>
+          <p:cNvPicPr>
+            <a:picLocks noChangeAspect="1" noChangeArrowheads="1"/>
+          </p:cNvPicPr>
+          <p:nvPr/>
+        </p:nvPicPr>
+        <p:blipFill>
+          <a:blip r:embed="rId6">
+            <a:extLst>
+              <a:ext uri="{28A0092B-C50C-407E-A947-70E740481C1C}">
+                <a14:useLocalDpi xmlns:a14="http://schemas.microsoft.com/office/drawing/2010/main" val="0"/>
+              </a:ext>
+            </a:extLst>
+          </a:blip>
+          <a:srcRect/>
+          <a:stretch>
+            <a:fillRect/>
+          </a:stretch>
+        </p:blipFill>
+        <p:spPr bwMode="auto">
+          <a:xfrm>
+            <a:off x="4544839" y="458030"/>
+            <a:ext cx="923925" cy="1276350"/>
+          </a:xfrm>
+          <a:prstGeom prst="rect">
+            <a:avLst/>
+          </a:prstGeom>
+          <a:noFill/>
+          <a:extLst>
+            <a:ext uri="{909E8E84-426E-40DD-AFC4-6F175D3DCCD1}">
+              <a14:hiddenFill xmlns:a14="http://schemas.microsoft.com/office/drawing/2010/main">
+                <a:solidFill>
+                  <a:srgbClr val="FFFFFF"/>
+                </a:solidFill>
+              </a14:hiddenFill>
+            </a:ext>
+          </a:extLst>
+        </p:spPr>
+      </p:pic>
+      <p:pic>
+        <p:nvPicPr>
+          <p:cNvPr id="9" name="Graphic 8" descr="Database with solid fill">
+            <a:extLst>
+              <a:ext uri="{FF2B5EF4-FFF2-40B4-BE49-F238E27FC236}">
+                <a16:creationId xmlns:a16="http://schemas.microsoft.com/office/drawing/2014/main" id="{D7207290-B296-F359-C8B8-06AF7B7826D5}"/>
+              </a:ext>
+            </a:extLst>
+          </p:cNvPr>
+          <p:cNvPicPr>
+            <a:picLocks noChangeAspect="1"/>
+          </p:cNvPicPr>
+          <p:nvPr/>
+        </p:nvPicPr>
+        <p:blipFill>
+          <a:blip r:embed="rId7">
+            <a:extLst>
+              <a:ext uri="{28A0092B-C50C-407E-A947-70E740481C1C}">
+                <a14:useLocalDpi xmlns:a14="http://schemas.microsoft.com/office/drawing/2010/main" val="0"/>
+              </a:ext>
+              <a:ext uri="{96DAC541-7B7A-43D3-8B79-37D633B846F1}">
+                <asvg:svgBlip xmlns:asvg="http://schemas.microsoft.com/office/drawing/2016/SVG/main" r:embed="rId8"/>
+              </a:ext>
+            </a:extLst>
+          </a:blip>
+          <a:stretch>
+            <a:fillRect/>
+          </a:stretch>
+        </p:blipFill>
+        <p:spPr>
+          <a:xfrm>
+            <a:off x="8627954" y="1457622"/>
+            <a:ext cx="914400" cy="914400"/>
+          </a:xfrm>
+          <a:prstGeom prst="rect">
+            <a:avLst/>
+          </a:prstGeom>
+        </p:spPr>
+      </p:pic>
+      <p:sp>
+        <p:nvSpPr>
+          <p:cNvPr id="10" name="Rectangle 9">
+            <a:extLst>
+              <a:ext uri="{FF2B5EF4-FFF2-40B4-BE49-F238E27FC236}">
+                <a16:creationId xmlns:a16="http://schemas.microsoft.com/office/drawing/2014/main" id="{E3B76487-1B54-C526-0C7C-27FB468890B5}"/>
+              </a:ext>
+            </a:extLst>
+          </p:cNvPr>
+          <p:cNvSpPr/>
+          <p:nvPr/>
+        </p:nvSpPr>
+        <p:spPr>
+          <a:xfrm>
+            <a:off x="8439324" y="545905"/>
+            <a:ext cx="1266739" cy="2054681"/>
+          </a:xfrm>
+          <a:prstGeom prst="rect">
+            <a:avLst/>
+          </a:prstGeom>
+          <a:noFill/>
+          <a:ln>
+            <a:solidFill>
+              <a:srgbClr val="FF0000"/>
+            </a:solidFill>
+          </a:ln>
+        </p:spPr>
+        <p:style>
+          <a:lnRef idx="2">
+            <a:schemeClr val="accent1">
+              <a:shade val="15000"/>
+            </a:schemeClr>
+          </a:lnRef>
+          <a:fillRef idx="1">
+            <a:schemeClr val="accent1"/>
+          </a:fillRef>
+          <a:effectRef idx="0">
+            <a:schemeClr val="accent1"/>
+          </a:effectRef>
+          <a:fontRef idx="minor">
+            <a:schemeClr val="lt1"/>
+          </a:fontRef>
+        </p:style>
+        <p:txBody>
+          <a:bodyPr rtlCol="0" anchor="ctr"/>
+          <a:lstStyle/>
+          <a:p>
+            <a:pPr algn="ctr"/>
+            <a:endParaRPr lang="LID4096"/>
+          </a:p>
+        </p:txBody>
+      </p:sp>
+      <p:cxnSp>
+        <p:nvCxnSpPr>
+          <p:cNvPr id="12" name="Straight Arrow Connector 11">
+            <a:extLst>
+              <a:ext uri="{FF2B5EF4-FFF2-40B4-BE49-F238E27FC236}">
+                <a16:creationId xmlns:a16="http://schemas.microsoft.com/office/drawing/2014/main" id="{7E090BBC-8CB1-B274-7CF9-6E2C77788873}"/>
+              </a:ext>
+            </a:extLst>
+          </p:cNvPr>
+          <p:cNvCxnSpPr>
+            <a:cxnSpLocks/>
+          </p:cNvCxnSpPr>
+          <p:nvPr/>
+        </p:nvCxnSpPr>
+        <p:spPr>
+          <a:xfrm>
+            <a:off x="5415663" y="1096205"/>
+            <a:ext cx="2970560" cy="0"/>
+          </a:xfrm>
+          <a:prstGeom prst="straightConnector1">
+            <a:avLst/>
+          </a:prstGeom>
+          <a:ln>
+            <a:tailEnd type="triangle"/>
+          </a:ln>
+        </p:spPr>
+        <p:style>
+          <a:lnRef idx="1">
+            <a:schemeClr val="accent1"/>
+          </a:lnRef>
+          <a:fillRef idx="0">
+            <a:schemeClr val="accent1"/>
+          </a:fillRef>
+          <a:effectRef idx="0">
+            <a:schemeClr val="accent1"/>
+          </a:effectRef>
+          <a:fontRef idx="minor">
+            <a:schemeClr val="tx1"/>
+          </a:fontRef>
+        </p:style>
+      </p:cxnSp>
+      <p:cxnSp>
+        <p:nvCxnSpPr>
+          <p:cNvPr id="13" name="Straight Arrow Connector 12">
+            <a:extLst>
+              <a:ext uri="{FF2B5EF4-FFF2-40B4-BE49-F238E27FC236}">
+                <a16:creationId xmlns:a16="http://schemas.microsoft.com/office/drawing/2014/main" id="{D2E6E465-7EA4-B41D-CFC5-6F2455CF5CD5}"/>
+              </a:ext>
+            </a:extLst>
+          </p:cNvPr>
+          <p:cNvCxnSpPr>
+            <a:cxnSpLocks/>
+          </p:cNvCxnSpPr>
+          <p:nvPr/>
+        </p:nvCxnSpPr>
+        <p:spPr>
+          <a:xfrm flipH="1" flipV="1">
+            <a:off x="5362562" y="1394628"/>
+            <a:ext cx="3023661" cy="1"/>
+          </a:xfrm>
+          <a:prstGeom prst="straightConnector1">
+            <a:avLst/>
+          </a:prstGeom>
+          <a:ln>
+            <a:tailEnd type="triangle"/>
+          </a:ln>
+        </p:spPr>
+        <p:style>
+          <a:lnRef idx="1">
+            <a:schemeClr val="accent1"/>
+          </a:lnRef>
+          <a:fillRef idx="0">
+            <a:schemeClr val="accent1"/>
+          </a:fillRef>
+          <a:effectRef idx="0">
+            <a:schemeClr val="accent1"/>
+          </a:effectRef>
+          <a:fontRef idx="minor">
+            <a:schemeClr val="tx1"/>
+          </a:fontRef>
+        </p:style>
+      </p:cxnSp>
+      <p:sp>
+        <p:nvSpPr>
+          <p:cNvPr id="17" name="TextBox 16">
+            <a:extLst>
+              <a:ext uri="{FF2B5EF4-FFF2-40B4-BE49-F238E27FC236}">
+                <a16:creationId xmlns:a16="http://schemas.microsoft.com/office/drawing/2014/main" id="{53C94469-86EF-646A-FD62-B7102DB9F9BE}"/>
+              </a:ext>
+            </a:extLst>
+          </p:cNvPr>
+          <p:cNvSpPr txBox="1"/>
+          <p:nvPr/>
+        </p:nvSpPr>
+        <p:spPr>
+          <a:xfrm>
+            <a:off x="6492081" y="726873"/>
+            <a:ext cx="527709" cy="369332"/>
+          </a:xfrm>
+          <a:prstGeom prst="rect">
+            <a:avLst/>
+          </a:prstGeom>
+          <a:noFill/>
+        </p:spPr>
+        <p:txBody>
+          <a:bodyPr wrap="none" rtlCol="0">
+            <a:spAutoFit/>
+          </a:bodyPr>
+          <a:lstStyle/>
+          <a:p>
+            <a:r>
+              <a:rPr lang="en-US" dirty="0" err="1"/>
+              <a:t>ada</a:t>
+            </a:r>
+            <a:endParaRPr lang="LID4096" dirty="0"/>
+          </a:p>
+        </p:txBody>
+      </p:sp>
+      <p:pic>
+        <p:nvPicPr>
+          <p:cNvPr id="19" name="Picture 18">
+            <a:extLst>
+              <a:ext uri="{FF2B5EF4-FFF2-40B4-BE49-F238E27FC236}">
+                <a16:creationId xmlns:a16="http://schemas.microsoft.com/office/drawing/2014/main" id="{AA928DAD-B6CD-3882-884B-AAE28FB05F0E}"/>
+              </a:ext>
+            </a:extLst>
+          </p:cNvPr>
+          <p:cNvPicPr>
+            <a:picLocks noChangeAspect="1"/>
+          </p:cNvPicPr>
+          <p:nvPr/>
+        </p:nvPicPr>
+        <p:blipFill>
+          <a:blip r:embed="rId9"/>
+          <a:stretch>
+            <a:fillRect/>
+          </a:stretch>
+        </p:blipFill>
+        <p:spPr>
+          <a:xfrm>
+            <a:off x="522583" y="2331227"/>
+            <a:ext cx="7457344" cy="3794499"/>
+          </a:xfrm>
+          <a:prstGeom prst="rect">
+            <a:avLst/>
+          </a:prstGeom>
+        </p:spPr>
+      </p:pic>
     </p:spTree>
     <p:extLst>
       <p:ext uri="{BB962C8B-B14F-4D97-AF65-F5344CB8AC3E}">
-        <p14:creationId xmlns:p14="http://schemas.microsoft.com/office/powerpoint/2010/main" val="2184338188"/>
+        <p14:creationId xmlns:p14="http://schemas.microsoft.com/office/powerpoint/2010/main" val="862848499"/>
       </p:ext>
     </p:extLst>
   </p:cSld>
   <p:clrMapOvr>
     <a:masterClrMapping/>
   </p:clrMapOvr>
-  <mc:AlternateContent xmlns:mc="http://schemas.openxmlformats.org/markup-compatibility/2006" xmlns:p14="http://schemas.microsoft.com/office/powerpoint/2010/main">
-    <mc:Choice Requires="p14">
+  <mc:AlternateContent xmlns:mc="http://schemas.openxmlformats.org/markup-compatibility/2006">
+    <mc:Choice xmlns:p14="http://schemas.microsoft.com/office/powerpoint/2010/main" Requires="p14">
       <p:transition spd="med" p14:dur="700">
         <p:fade/>
       </p:transition>
     </mc:Choice>
-    <mc:Fallback xmlns="">
+    <mc:Fallback>
       <p:transition spd="med">
         <p:fade/>
       </p:transition>
@@ -11501,6 +12831,160 @@
           </a:p>
         </p:txBody>
       </p:sp>
+    </p:spTree>
+    <p:extLst>
+      <p:ext uri="{BB962C8B-B14F-4D97-AF65-F5344CB8AC3E}">
+        <p14:creationId xmlns:p14="http://schemas.microsoft.com/office/powerpoint/2010/main" val="2184338188"/>
+      </p:ext>
+    </p:extLst>
+  </p:cSld>
+  <p:clrMapOvr>
+    <a:masterClrMapping/>
+  </p:clrMapOvr>
+  <mc:AlternateContent xmlns:mc="http://schemas.openxmlformats.org/markup-compatibility/2006" xmlns:p14="http://schemas.microsoft.com/office/powerpoint/2010/main">
+    <mc:Choice Requires="p14">
+      <p:transition spd="med" p14:dur="700">
+        <p:fade/>
+      </p:transition>
+    </mc:Choice>
+    <mc:Fallback xmlns="">
+      <p:transition spd="med">
+        <p:fade/>
+      </p:transition>
+    </mc:Fallback>
+  </mc:AlternateContent>
+</p:sld>
+</file>
+
+<file path=ppt/slides/slide6.xml><?xml version="1.0" encoding="utf-8"?>
+<p:sld xmlns:a="http://schemas.openxmlformats.org/drawingml/2006/main" xmlns:r="http://schemas.openxmlformats.org/officeDocument/2006/relationships" xmlns:p="http://schemas.openxmlformats.org/presentationml/2006/main">
+  <p:cSld>
+    <p:spTree>
+      <p:nvGrpSpPr>
+        <p:cNvPr id="1" name=""/>
+        <p:cNvGrpSpPr/>
+        <p:nvPr/>
+      </p:nvGrpSpPr>
+      <p:grpSpPr>
+        <a:xfrm>
+          <a:off x="0" y="0"/>
+          <a:ext cx="0" cy="0"/>
+          <a:chOff x="0" y="0"/>
+          <a:chExt cx="0" cy="0"/>
+        </a:xfrm>
+      </p:grpSpPr>
+      <p:pic>
+        <p:nvPicPr>
+          <p:cNvPr id="59" name="Picture 58" descr="A diagram of a project&#10;&#10;Description automatically generated">
+            <a:extLst>
+              <a:ext uri="{FF2B5EF4-FFF2-40B4-BE49-F238E27FC236}">
+                <a16:creationId xmlns:a16="http://schemas.microsoft.com/office/drawing/2014/main" id="{EBF968B3-BE24-871C-726F-6E857EEF0F8D}"/>
+              </a:ext>
+            </a:extLst>
+          </p:cNvPr>
+          <p:cNvPicPr>
+            <a:picLocks noChangeAspect="1"/>
+          </p:cNvPicPr>
+          <p:nvPr/>
+        </p:nvPicPr>
+        <p:blipFill>
+          <a:blip r:embed="rId2">
+            <a:extLst>
+              <a:ext uri="{28A0092B-C50C-407E-A947-70E740481C1C}">
+                <a14:useLocalDpi xmlns:a14="http://schemas.microsoft.com/office/drawing/2010/main" val="0"/>
+              </a:ext>
+            </a:extLst>
+          </a:blip>
+          <a:stretch>
+            <a:fillRect/>
+          </a:stretch>
+        </p:blipFill>
+        <p:spPr>
+          <a:xfrm>
+            <a:off x="260377" y="458030"/>
+            <a:ext cx="10310571" cy="6007482"/>
+          </a:xfrm>
+          <a:prstGeom prst="rect">
+            <a:avLst/>
+          </a:prstGeom>
+        </p:spPr>
+      </p:pic>
+      <p:pic>
+        <p:nvPicPr>
+          <p:cNvPr id="5" name="Content Placeholder 5">
+            <a:extLst>
+              <a:ext uri="{FF2B5EF4-FFF2-40B4-BE49-F238E27FC236}">
+                <a16:creationId xmlns:a16="http://schemas.microsoft.com/office/drawing/2014/main" id="{A8C9261E-9AB2-5FC2-1EED-856C6C8F2BF8}"/>
+              </a:ext>
+            </a:extLst>
+          </p:cNvPr>
+          <p:cNvPicPr>
+            <a:picLocks noChangeAspect="1"/>
+          </p:cNvPicPr>
+          <p:nvPr/>
+        </p:nvPicPr>
+        <p:blipFill>
+          <a:blip r:embed="rId3"/>
+          <a:stretch>
+            <a:fillRect/>
+          </a:stretch>
+        </p:blipFill>
+        <p:spPr>
+          <a:xfrm>
+            <a:off x="12179100" y="6320245"/>
+            <a:ext cx="643777" cy="487304"/>
+          </a:xfrm>
+          <a:prstGeom prst="rect">
+            <a:avLst/>
+          </a:prstGeom>
+        </p:spPr>
+      </p:pic>
+      <p:sp>
+        <p:nvSpPr>
+          <p:cNvPr id="6" name="Title 1">
+            <a:extLst>
+              <a:ext uri="{FF2B5EF4-FFF2-40B4-BE49-F238E27FC236}">
+                <a16:creationId xmlns:a16="http://schemas.microsoft.com/office/drawing/2014/main" id="{A56377DB-5151-6A4B-2584-F5511BBED9A5}"/>
+              </a:ext>
+            </a:extLst>
+          </p:cNvPr>
+          <p:cNvSpPr>
+            <a:spLocks noGrp="1"/>
+          </p:cNvSpPr>
+          <p:nvPr>
+            <p:ph type="title"/>
+          </p:nvPr>
+        </p:nvSpPr>
+        <p:spPr>
+          <a:xfrm>
+            <a:off x="478641" y="15030"/>
+            <a:ext cx="9874044" cy="443000"/>
+          </a:xfrm>
+        </p:spPr>
+        <p:txBody>
+          <a:bodyPr>
+            <a:normAutofit/>
+          </a:bodyPr>
+          <a:lstStyle/>
+          <a:p>
+            <a:r>
+              <a:rPr lang="en-US" sz="1314" b="1" dirty="0">
+                <a:solidFill>
+                  <a:schemeClr val="accent1"/>
+                </a:solidFill>
+                <a:latin typeface="Avenir Next" panose="020B0503020202020204" pitchFamily="34" charset="0"/>
+              </a:rPr>
+              <a:t>Progress update:  Work breakdown structure (WBS)</a:t>
+            </a:r>
+            <a:endParaRPr lang="en-NL" sz="1314" b="1" dirty="0">
+              <a:solidFill>
+                <a:schemeClr val="accent1"/>
+              </a:solidFill>
+              <a:latin typeface="Avenir Next" panose="020B0503020202020204" pitchFamily="34" charset="0"/>
+            </a:endParaRPr>
+          </a:p>
+        </p:txBody>
+      </p:sp>
       <p:sp>
         <p:nvSpPr>
           <p:cNvPr id="2" name="Rectangle 1">
@@ -11661,442 +13145,6 @@
     <p:extLst>
       <p:ext uri="{BB962C8B-B14F-4D97-AF65-F5344CB8AC3E}">
         <p14:creationId xmlns:p14="http://schemas.microsoft.com/office/powerpoint/2010/main" val="3839556140"/>
-      </p:ext>
-    </p:extLst>
-  </p:cSld>
-  <p:clrMapOvr>
-    <a:masterClrMapping/>
-  </p:clrMapOvr>
-  <mc:AlternateContent xmlns:mc="http://schemas.openxmlformats.org/markup-compatibility/2006" xmlns:p14="http://schemas.microsoft.com/office/powerpoint/2010/main">
-    <mc:Choice Requires="p14">
-      <p:transition spd="med" p14:dur="700">
-        <p:fade/>
-      </p:transition>
-    </mc:Choice>
-    <mc:Fallback xmlns="">
-      <p:transition spd="med">
-        <p:fade/>
-      </p:transition>
-    </mc:Fallback>
-  </mc:AlternateContent>
-</p:sld>
-</file>
-
-<file path=ppt/slides/slide6.xml><?xml version="1.0" encoding="utf-8"?>
-<p:sld xmlns:a="http://schemas.openxmlformats.org/drawingml/2006/main" xmlns:r="http://schemas.openxmlformats.org/officeDocument/2006/relationships" xmlns:p="http://schemas.openxmlformats.org/presentationml/2006/main">
-  <p:cSld>
-    <p:spTree>
-      <p:nvGrpSpPr>
-        <p:cNvPr id="1" name=""/>
-        <p:cNvGrpSpPr/>
-        <p:nvPr/>
-      </p:nvGrpSpPr>
-      <p:grpSpPr>
-        <a:xfrm>
-          <a:off x="0" y="0"/>
-          <a:ext cx="0" cy="0"/>
-          <a:chOff x="0" y="0"/>
-          <a:chExt cx="0" cy="0"/>
-        </a:xfrm>
-      </p:grpSpPr>
-      <p:pic>
-        <p:nvPicPr>
-          <p:cNvPr id="5" name="Content Placeholder 5">
-            <a:extLst>
-              <a:ext uri="{FF2B5EF4-FFF2-40B4-BE49-F238E27FC236}">
-                <a16:creationId xmlns:a16="http://schemas.microsoft.com/office/drawing/2014/main" id="{A8C9261E-9AB2-5FC2-1EED-856C6C8F2BF8}"/>
-              </a:ext>
-            </a:extLst>
-          </p:cNvPr>
-          <p:cNvPicPr>
-            <a:picLocks noChangeAspect="1"/>
-          </p:cNvPicPr>
-          <p:nvPr/>
-        </p:nvPicPr>
-        <p:blipFill>
-          <a:blip r:embed="rId2"/>
-          <a:stretch>
-            <a:fillRect/>
-          </a:stretch>
-        </p:blipFill>
-        <p:spPr>
-          <a:xfrm>
-            <a:off x="12179100" y="6320245"/>
-            <a:ext cx="643777" cy="487304"/>
-          </a:xfrm>
-          <a:prstGeom prst="rect">
-            <a:avLst/>
-          </a:prstGeom>
-        </p:spPr>
-      </p:pic>
-      <p:sp>
-        <p:nvSpPr>
-          <p:cNvPr id="6" name="Title 1">
-            <a:extLst>
-              <a:ext uri="{FF2B5EF4-FFF2-40B4-BE49-F238E27FC236}">
-                <a16:creationId xmlns:a16="http://schemas.microsoft.com/office/drawing/2014/main" id="{A56377DB-5151-6A4B-2584-F5511BBED9A5}"/>
-              </a:ext>
-            </a:extLst>
-          </p:cNvPr>
-          <p:cNvSpPr>
-            <a:spLocks noGrp="1"/>
-          </p:cNvSpPr>
-          <p:nvPr>
-            <p:ph type="title"/>
-          </p:nvPr>
-        </p:nvSpPr>
-        <p:spPr>
-          <a:xfrm>
-            <a:off x="478641" y="15030"/>
-            <a:ext cx="9874044" cy="443000"/>
-          </a:xfrm>
-        </p:spPr>
-        <p:txBody>
-          <a:bodyPr>
-            <a:normAutofit/>
-          </a:bodyPr>
-          <a:lstStyle/>
-          <a:p>
-            <a:r>
-              <a:rPr lang="en-US" sz="1314" b="1" dirty="0">
-                <a:solidFill>
-                  <a:schemeClr val="accent1"/>
-                </a:solidFill>
-                <a:latin typeface="Avenir Next" panose="020B0503020202020204" pitchFamily="34" charset="0"/>
-              </a:rPr>
-              <a:t>Progress update:  Use cases</a:t>
-            </a:r>
-            <a:endParaRPr lang="en-NL" sz="1314" b="1" dirty="0">
-              <a:solidFill>
-                <a:schemeClr val="accent1"/>
-              </a:solidFill>
-              <a:latin typeface="Avenir Next" panose="020B0503020202020204" pitchFamily="34" charset="0"/>
-            </a:endParaRPr>
-          </a:p>
-        </p:txBody>
-      </p:sp>
-      <p:sp>
-        <p:nvSpPr>
-          <p:cNvPr id="7" name="TextBox 6">
-            <a:extLst>
-              <a:ext uri="{FF2B5EF4-FFF2-40B4-BE49-F238E27FC236}">
-                <a16:creationId xmlns:a16="http://schemas.microsoft.com/office/drawing/2014/main" id="{B4F7AFA3-02E1-77F0-997E-6312CC9CE99B}"/>
-              </a:ext>
-            </a:extLst>
-          </p:cNvPr>
-          <p:cNvSpPr txBox="1"/>
-          <p:nvPr/>
-        </p:nvSpPr>
-        <p:spPr>
-          <a:xfrm>
-            <a:off x="679512" y="1962718"/>
-            <a:ext cx="6543410" cy="2760051"/>
-          </a:xfrm>
-          <a:prstGeom prst="rect">
-            <a:avLst/>
-          </a:prstGeom>
-          <a:noFill/>
-        </p:spPr>
-        <p:txBody>
-          <a:bodyPr wrap="square" rtlCol="0">
-            <a:spAutoFit/>
-          </a:bodyPr>
-          <a:lstStyle/>
-          <a:p>
-            <a:pPr marL="342900" indent="-342900">
-              <a:buFont typeface="Wingdings" panose="05000000000000000000" pitchFamily="2" charset="2"/>
-              <a:buChar char="ü"/>
-            </a:pPr>
-            <a:r>
-              <a:rPr lang="en-US" sz="1867" dirty="0"/>
-              <a:t>Input data validation</a:t>
-            </a:r>
-          </a:p>
-          <a:p>
-            <a:pPr marL="342900" indent="-342900">
-              <a:buFont typeface="Wingdings" panose="05000000000000000000" pitchFamily="2" charset="2"/>
-              <a:buChar char="ü"/>
-            </a:pPr>
-            <a:r>
-              <a:rPr lang="en-US" sz="1867" dirty="0"/>
-              <a:t>User authentication (user roles)</a:t>
-            </a:r>
-          </a:p>
-          <a:p>
-            <a:pPr marL="342900" indent="-342900">
-              <a:buFont typeface="Wingdings" panose="05000000000000000000" pitchFamily="2" charset="2"/>
-              <a:buChar char="ü"/>
-            </a:pPr>
-            <a:r>
-              <a:rPr lang="en-US" sz="1867" dirty="0"/>
-              <a:t>Fetch result for specific task (</a:t>
-            </a:r>
-            <a:r>
-              <a:rPr lang="en-US" sz="1400" dirty="0">
-                <a:solidFill>
-                  <a:srgbClr val="FF0000"/>
-                </a:solidFill>
-              </a:rPr>
-              <a:t>depends on stakeholder needs</a:t>
-            </a:r>
-            <a:r>
-              <a:rPr lang="en-US" sz="1867" dirty="0"/>
-              <a:t>)</a:t>
-            </a:r>
-          </a:p>
-          <a:p>
-            <a:pPr marL="342900" indent="-342900">
-              <a:buFont typeface="Wingdings" panose="05000000000000000000" pitchFamily="2" charset="2"/>
-              <a:buChar char="ü"/>
-            </a:pPr>
-            <a:r>
-              <a:rPr lang="en-US" sz="1867" dirty="0"/>
-              <a:t>File explorer to select files and </a:t>
-            </a:r>
-            <a:r>
-              <a:rPr lang="en-US" sz="1867" dirty="0" err="1"/>
-              <a:t>dir</a:t>
-            </a:r>
-            <a:r>
-              <a:rPr lang="en-US" sz="1867" dirty="0"/>
-              <a:t> from </a:t>
-            </a:r>
-            <a:r>
-              <a:rPr lang="en-US" sz="1867" dirty="0" err="1"/>
-              <a:t>dCache</a:t>
-            </a:r>
-            <a:r>
-              <a:rPr lang="en-US" sz="1867" dirty="0"/>
-              <a:t> using </a:t>
-            </a:r>
-            <a:r>
-              <a:rPr lang="en-US" sz="1867" dirty="0" err="1"/>
-              <a:t>ada</a:t>
-            </a:r>
-            <a:r>
-              <a:rPr lang="en-US" sz="1867" dirty="0"/>
-              <a:t> and macaroon</a:t>
-            </a:r>
-          </a:p>
-          <a:p>
-            <a:pPr lvl="1"/>
-            <a:br>
-              <a:rPr lang="en-US" sz="1867" dirty="0"/>
-            </a:br>
-            <a:endParaRPr lang="en-US" sz="1867" dirty="0"/>
-          </a:p>
-          <a:p>
-            <a:endParaRPr lang="en-US" sz="2133" dirty="0"/>
-          </a:p>
-          <a:p>
-            <a:pPr marL="381003" indent="-381003">
-              <a:buFont typeface="Wingdings" panose="05000000000000000000" pitchFamily="2" charset="2"/>
-              <a:buChar char="ü"/>
-            </a:pPr>
-            <a:endParaRPr lang="LID4096" sz="2133" dirty="0"/>
-          </a:p>
-        </p:txBody>
-      </p:sp>
-      <p:sp>
-        <p:nvSpPr>
-          <p:cNvPr id="8" name="TextBox 7">
-            <a:extLst>
-              <a:ext uri="{FF2B5EF4-FFF2-40B4-BE49-F238E27FC236}">
-                <a16:creationId xmlns:a16="http://schemas.microsoft.com/office/drawing/2014/main" id="{B00DC2B4-4FF5-4005-F387-ECD91F3030A9}"/>
-              </a:ext>
-            </a:extLst>
-          </p:cNvPr>
-          <p:cNvSpPr txBox="1"/>
-          <p:nvPr/>
-        </p:nvSpPr>
-        <p:spPr>
-          <a:xfrm>
-            <a:off x="478641" y="1389524"/>
-            <a:ext cx="1011624" cy="369332"/>
-          </a:xfrm>
-          <a:prstGeom prst="rect">
-            <a:avLst/>
-          </a:prstGeom>
-          <a:noFill/>
-        </p:spPr>
-        <p:txBody>
-          <a:bodyPr wrap="none" rtlCol="0">
-            <a:spAutoFit/>
-          </a:bodyPr>
-          <a:lstStyle/>
-          <a:p>
-            <a:r>
-              <a:rPr lang="en-US" b="1" dirty="0"/>
-              <a:t>WebApp</a:t>
-            </a:r>
-            <a:endParaRPr lang="LID4096" b="1" dirty="0"/>
-          </a:p>
-        </p:txBody>
-      </p:sp>
-      <p:sp>
-        <p:nvSpPr>
-          <p:cNvPr id="9" name="TextBox 8">
-            <a:extLst>
-              <a:ext uri="{FF2B5EF4-FFF2-40B4-BE49-F238E27FC236}">
-                <a16:creationId xmlns:a16="http://schemas.microsoft.com/office/drawing/2014/main" id="{0368F3A5-130A-DAB6-B50D-67D22CEDDFDC}"/>
-              </a:ext>
-            </a:extLst>
-          </p:cNvPr>
-          <p:cNvSpPr txBox="1"/>
-          <p:nvPr/>
-        </p:nvSpPr>
-        <p:spPr>
-          <a:xfrm>
-            <a:off x="478641" y="3975700"/>
-            <a:ext cx="991105" cy="369332"/>
-          </a:xfrm>
-          <a:prstGeom prst="rect">
-            <a:avLst/>
-          </a:prstGeom>
-          <a:noFill/>
-        </p:spPr>
-        <p:txBody>
-          <a:bodyPr wrap="none" rtlCol="0">
-            <a:spAutoFit/>
-          </a:bodyPr>
-          <a:lstStyle/>
-          <a:p>
-            <a:r>
-              <a:rPr lang="en-US" b="1" dirty="0"/>
-              <a:t>Backend</a:t>
-            </a:r>
-            <a:endParaRPr lang="LID4096" b="1" dirty="0"/>
-          </a:p>
-        </p:txBody>
-      </p:sp>
-      <p:sp>
-        <p:nvSpPr>
-          <p:cNvPr id="10" name="TextBox 9">
-            <a:extLst>
-              <a:ext uri="{FF2B5EF4-FFF2-40B4-BE49-F238E27FC236}">
-                <a16:creationId xmlns:a16="http://schemas.microsoft.com/office/drawing/2014/main" id="{773FC060-542F-BAB3-BDF8-F000C00F157D}"/>
-              </a:ext>
-            </a:extLst>
-          </p:cNvPr>
-          <p:cNvSpPr txBox="1"/>
-          <p:nvPr/>
-        </p:nvSpPr>
-        <p:spPr>
-          <a:xfrm>
-            <a:off x="783921" y="4548894"/>
-            <a:ext cx="9349980" cy="2185406"/>
-          </a:xfrm>
-          <a:prstGeom prst="rect">
-            <a:avLst/>
-          </a:prstGeom>
-          <a:noFill/>
-        </p:spPr>
-        <p:txBody>
-          <a:bodyPr wrap="square" rtlCol="0">
-            <a:spAutoFit/>
-          </a:bodyPr>
-          <a:lstStyle/>
-          <a:p>
-            <a:pPr marL="342900" indent="-342900">
-              <a:buFont typeface="Wingdings" panose="05000000000000000000" pitchFamily="2" charset="2"/>
-              <a:buChar char="ü"/>
-            </a:pPr>
-            <a:r>
-              <a:rPr lang="en-US" sz="1867" dirty="0"/>
-              <a:t>Prepare singularity images for tasks (models from Computer vision group)</a:t>
-            </a:r>
-          </a:p>
-          <a:p>
-            <a:pPr marL="342900" indent="-342900">
-              <a:buFont typeface="Wingdings" panose="05000000000000000000" pitchFamily="2" charset="2"/>
-              <a:buChar char="ü"/>
-            </a:pPr>
-            <a:r>
-              <a:rPr lang="en-US" sz="1867" dirty="0"/>
-              <a:t>Prepare different pilot jobs(</a:t>
-            </a:r>
-            <a:r>
-              <a:rPr lang="en-US" sz="1400" dirty="0">
-                <a:solidFill>
-                  <a:srgbClr val="FF0000"/>
-                </a:solidFill>
-              </a:rPr>
-              <a:t>depends on stakeholder needs</a:t>
-            </a:r>
-            <a:r>
-              <a:rPr lang="en-US" sz="1867" dirty="0"/>
-              <a:t>)</a:t>
-            </a:r>
-          </a:p>
-          <a:p>
-            <a:pPr marL="342900" indent="-342900">
-              <a:buFont typeface="Wingdings" panose="05000000000000000000" pitchFamily="2" charset="2"/>
-              <a:buChar char="ü"/>
-            </a:pPr>
-            <a:r>
-              <a:rPr lang="en-US" sz="1867" dirty="0"/>
-              <a:t>Automate pilot job submission</a:t>
-            </a:r>
-          </a:p>
-          <a:p>
-            <a:pPr lvl="1"/>
-            <a:br>
-              <a:rPr lang="en-US" sz="1867" dirty="0"/>
-            </a:br>
-            <a:endParaRPr lang="en-US" sz="1867" dirty="0"/>
-          </a:p>
-          <a:p>
-            <a:endParaRPr lang="en-US" sz="2133" dirty="0"/>
-          </a:p>
-          <a:p>
-            <a:pPr marL="381003" indent="-381003">
-              <a:buFont typeface="Wingdings" panose="05000000000000000000" pitchFamily="2" charset="2"/>
-              <a:buChar char="ü"/>
-            </a:pPr>
-            <a:endParaRPr lang="LID4096" sz="2133" dirty="0"/>
-          </a:p>
-        </p:txBody>
-      </p:sp>
-      <p:sp>
-        <p:nvSpPr>
-          <p:cNvPr id="11" name="TextBox 10">
-            <a:extLst>
-              <a:ext uri="{FF2B5EF4-FFF2-40B4-BE49-F238E27FC236}">
-                <a16:creationId xmlns:a16="http://schemas.microsoft.com/office/drawing/2014/main" id="{E16F2E4D-4590-1A60-CE79-E437BA4723C3}"/>
-              </a:ext>
-            </a:extLst>
-          </p:cNvPr>
-          <p:cNvSpPr txBox="1"/>
-          <p:nvPr/>
-        </p:nvSpPr>
-        <p:spPr>
-          <a:xfrm>
-            <a:off x="478641" y="739111"/>
-            <a:ext cx="6434710" cy="369332"/>
-          </a:xfrm>
-          <a:prstGeom prst="rect">
-            <a:avLst/>
-          </a:prstGeom>
-          <a:noFill/>
-        </p:spPr>
-        <p:txBody>
-          <a:bodyPr wrap="none" rtlCol="0">
-            <a:spAutoFit/>
-          </a:bodyPr>
-          <a:lstStyle/>
-          <a:p>
-            <a:r>
-              <a:rPr lang="en-US" dirty="0"/>
-              <a:t>The following are the remaining tasks from WebApp and Backend</a:t>
-            </a:r>
-            <a:endParaRPr lang="LID4096" dirty="0"/>
-          </a:p>
-        </p:txBody>
-      </p:sp>
-    </p:spTree>
-    <p:extLst>
-      <p:ext uri="{BB962C8B-B14F-4D97-AF65-F5344CB8AC3E}">
-        <p14:creationId xmlns:p14="http://schemas.microsoft.com/office/powerpoint/2010/main" val="2800299129"/>
       </p:ext>
     </p:extLst>
   </p:cSld>
@@ -12200,6 +13248,442 @@
                 </a:solidFill>
                 <a:latin typeface="Avenir Next" panose="020B0503020202020204" pitchFamily="34" charset="0"/>
               </a:rPr>
+              <a:t>Progress update:  Use cases</a:t>
+            </a:r>
+            <a:endParaRPr lang="en-NL" sz="1314" b="1" dirty="0">
+              <a:solidFill>
+                <a:schemeClr val="accent1"/>
+              </a:solidFill>
+              <a:latin typeface="Avenir Next" panose="020B0503020202020204" pitchFamily="34" charset="0"/>
+            </a:endParaRPr>
+          </a:p>
+        </p:txBody>
+      </p:sp>
+      <p:sp>
+        <p:nvSpPr>
+          <p:cNvPr id="7" name="TextBox 6">
+            <a:extLst>
+              <a:ext uri="{FF2B5EF4-FFF2-40B4-BE49-F238E27FC236}">
+                <a16:creationId xmlns:a16="http://schemas.microsoft.com/office/drawing/2014/main" id="{B4F7AFA3-02E1-77F0-997E-6312CC9CE99B}"/>
+              </a:ext>
+            </a:extLst>
+          </p:cNvPr>
+          <p:cNvSpPr txBox="1"/>
+          <p:nvPr/>
+        </p:nvSpPr>
+        <p:spPr>
+          <a:xfrm>
+            <a:off x="679512" y="1962718"/>
+            <a:ext cx="6543410" cy="2760051"/>
+          </a:xfrm>
+          <a:prstGeom prst="rect">
+            <a:avLst/>
+          </a:prstGeom>
+          <a:noFill/>
+        </p:spPr>
+        <p:txBody>
+          <a:bodyPr wrap="square" rtlCol="0">
+            <a:spAutoFit/>
+          </a:bodyPr>
+          <a:lstStyle/>
+          <a:p>
+            <a:pPr marL="342900" indent="-342900">
+              <a:buFont typeface="Wingdings" panose="05000000000000000000" pitchFamily="2" charset="2"/>
+              <a:buChar char="ü"/>
+            </a:pPr>
+            <a:r>
+              <a:rPr lang="en-US" sz="1867" dirty="0"/>
+              <a:t>Input data validation</a:t>
+            </a:r>
+          </a:p>
+          <a:p>
+            <a:pPr marL="342900" indent="-342900">
+              <a:buFont typeface="Wingdings" panose="05000000000000000000" pitchFamily="2" charset="2"/>
+              <a:buChar char="ü"/>
+            </a:pPr>
+            <a:r>
+              <a:rPr lang="en-US" sz="1867" dirty="0"/>
+              <a:t>User authentication (user roles)</a:t>
+            </a:r>
+          </a:p>
+          <a:p>
+            <a:pPr marL="342900" indent="-342900">
+              <a:buFont typeface="Wingdings" panose="05000000000000000000" pitchFamily="2" charset="2"/>
+              <a:buChar char="ü"/>
+            </a:pPr>
+            <a:r>
+              <a:rPr lang="en-US" sz="1867" dirty="0"/>
+              <a:t>Fetch result for specific task (</a:t>
+            </a:r>
+            <a:r>
+              <a:rPr lang="en-US" sz="1400" dirty="0">
+                <a:solidFill>
+                  <a:srgbClr val="FF0000"/>
+                </a:solidFill>
+              </a:rPr>
+              <a:t>depends on stakeholder needs</a:t>
+            </a:r>
+            <a:r>
+              <a:rPr lang="en-US" sz="1867" dirty="0"/>
+              <a:t>)</a:t>
+            </a:r>
+          </a:p>
+          <a:p>
+            <a:pPr marL="342900" indent="-342900">
+              <a:buFont typeface="Wingdings" panose="05000000000000000000" pitchFamily="2" charset="2"/>
+              <a:buChar char="ü"/>
+            </a:pPr>
+            <a:r>
+              <a:rPr lang="en-US" sz="1867" dirty="0"/>
+              <a:t>File explorer to select files and </a:t>
+            </a:r>
+            <a:r>
+              <a:rPr lang="en-US" sz="1867" dirty="0" err="1"/>
+              <a:t>dir</a:t>
+            </a:r>
+            <a:r>
+              <a:rPr lang="en-US" sz="1867" dirty="0"/>
+              <a:t> from </a:t>
+            </a:r>
+            <a:r>
+              <a:rPr lang="en-US" sz="1867" dirty="0" err="1"/>
+              <a:t>dCache</a:t>
+            </a:r>
+            <a:r>
+              <a:rPr lang="en-US" sz="1867" dirty="0"/>
+              <a:t> using </a:t>
+            </a:r>
+            <a:r>
+              <a:rPr lang="en-US" sz="1867" dirty="0" err="1"/>
+              <a:t>ada</a:t>
+            </a:r>
+            <a:r>
+              <a:rPr lang="en-US" sz="1867" dirty="0"/>
+              <a:t> and macaroon</a:t>
+            </a:r>
+          </a:p>
+          <a:p>
+            <a:pPr lvl="1"/>
+            <a:br>
+              <a:rPr lang="en-US" sz="1867" dirty="0"/>
+            </a:br>
+            <a:endParaRPr lang="en-US" sz="1867" dirty="0"/>
+          </a:p>
+          <a:p>
+            <a:endParaRPr lang="en-US" sz="2133" dirty="0"/>
+          </a:p>
+          <a:p>
+            <a:pPr marL="381003" indent="-381003">
+              <a:buFont typeface="Wingdings" panose="05000000000000000000" pitchFamily="2" charset="2"/>
+              <a:buChar char="ü"/>
+            </a:pPr>
+            <a:endParaRPr lang="LID4096" sz="2133" dirty="0"/>
+          </a:p>
+        </p:txBody>
+      </p:sp>
+      <p:sp>
+        <p:nvSpPr>
+          <p:cNvPr id="8" name="TextBox 7">
+            <a:extLst>
+              <a:ext uri="{FF2B5EF4-FFF2-40B4-BE49-F238E27FC236}">
+                <a16:creationId xmlns:a16="http://schemas.microsoft.com/office/drawing/2014/main" id="{B00DC2B4-4FF5-4005-F387-ECD91F3030A9}"/>
+              </a:ext>
+            </a:extLst>
+          </p:cNvPr>
+          <p:cNvSpPr txBox="1"/>
+          <p:nvPr/>
+        </p:nvSpPr>
+        <p:spPr>
+          <a:xfrm>
+            <a:off x="478641" y="1389524"/>
+            <a:ext cx="1011624" cy="369332"/>
+          </a:xfrm>
+          <a:prstGeom prst="rect">
+            <a:avLst/>
+          </a:prstGeom>
+          <a:noFill/>
+        </p:spPr>
+        <p:txBody>
+          <a:bodyPr wrap="none" rtlCol="0">
+            <a:spAutoFit/>
+          </a:bodyPr>
+          <a:lstStyle/>
+          <a:p>
+            <a:r>
+              <a:rPr lang="en-US" b="1" dirty="0"/>
+              <a:t>WebApp</a:t>
+            </a:r>
+            <a:endParaRPr lang="LID4096" b="1" dirty="0"/>
+          </a:p>
+        </p:txBody>
+      </p:sp>
+      <p:sp>
+        <p:nvSpPr>
+          <p:cNvPr id="9" name="TextBox 8">
+            <a:extLst>
+              <a:ext uri="{FF2B5EF4-FFF2-40B4-BE49-F238E27FC236}">
+                <a16:creationId xmlns:a16="http://schemas.microsoft.com/office/drawing/2014/main" id="{0368F3A5-130A-DAB6-B50D-67D22CEDDFDC}"/>
+              </a:ext>
+            </a:extLst>
+          </p:cNvPr>
+          <p:cNvSpPr txBox="1"/>
+          <p:nvPr/>
+        </p:nvSpPr>
+        <p:spPr>
+          <a:xfrm>
+            <a:off x="478641" y="3975700"/>
+            <a:ext cx="991105" cy="369332"/>
+          </a:xfrm>
+          <a:prstGeom prst="rect">
+            <a:avLst/>
+          </a:prstGeom>
+          <a:noFill/>
+        </p:spPr>
+        <p:txBody>
+          <a:bodyPr wrap="none" rtlCol="0">
+            <a:spAutoFit/>
+          </a:bodyPr>
+          <a:lstStyle/>
+          <a:p>
+            <a:r>
+              <a:rPr lang="en-US" b="1" dirty="0"/>
+              <a:t>Backend</a:t>
+            </a:r>
+            <a:endParaRPr lang="LID4096" b="1" dirty="0"/>
+          </a:p>
+        </p:txBody>
+      </p:sp>
+      <p:sp>
+        <p:nvSpPr>
+          <p:cNvPr id="10" name="TextBox 9">
+            <a:extLst>
+              <a:ext uri="{FF2B5EF4-FFF2-40B4-BE49-F238E27FC236}">
+                <a16:creationId xmlns:a16="http://schemas.microsoft.com/office/drawing/2014/main" id="{773FC060-542F-BAB3-BDF8-F000C00F157D}"/>
+              </a:ext>
+            </a:extLst>
+          </p:cNvPr>
+          <p:cNvSpPr txBox="1"/>
+          <p:nvPr/>
+        </p:nvSpPr>
+        <p:spPr>
+          <a:xfrm>
+            <a:off x="783921" y="4548894"/>
+            <a:ext cx="9349980" cy="2185406"/>
+          </a:xfrm>
+          <a:prstGeom prst="rect">
+            <a:avLst/>
+          </a:prstGeom>
+          <a:noFill/>
+        </p:spPr>
+        <p:txBody>
+          <a:bodyPr wrap="square" rtlCol="0">
+            <a:spAutoFit/>
+          </a:bodyPr>
+          <a:lstStyle/>
+          <a:p>
+            <a:pPr marL="342900" indent="-342900">
+              <a:buFont typeface="Wingdings" panose="05000000000000000000" pitchFamily="2" charset="2"/>
+              <a:buChar char="ü"/>
+            </a:pPr>
+            <a:r>
+              <a:rPr lang="en-US" sz="1867" dirty="0"/>
+              <a:t>Prepare singularity images for tasks (models from Computer vision group)</a:t>
+            </a:r>
+          </a:p>
+          <a:p>
+            <a:pPr marL="342900" indent="-342900">
+              <a:buFont typeface="Wingdings" panose="05000000000000000000" pitchFamily="2" charset="2"/>
+              <a:buChar char="ü"/>
+            </a:pPr>
+            <a:r>
+              <a:rPr lang="en-US" sz="1867" dirty="0"/>
+              <a:t>Prepare different pilot jobs(</a:t>
+            </a:r>
+            <a:r>
+              <a:rPr lang="en-US" sz="1400" dirty="0">
+                <a:solidFill>
+                  <a:srgbClr val="FF0000"/>
+                </a:solidFill>
+              </a:rPr>
+              <a:t>depends on stakeholder needs</a:t>
+            </a:r>
+            <a:r>
+              <a:rPr lang="en-US" sz="1867" dirty="0"/>
+              <a:t>)</a:t>
+            </a:r>
+          </a:p>
+          <a:p>
+            <a:pPr marL="342900" indent="-342900">
+              <a:buFont typeface="Wingdings" panose="05000000000000000000" pitchFamily="2" charset="2"/>
+              <a:buChar char="ü"/>
+            </a:pPr>
+            <a:r>
+              <a:rPr lang="en-US" sz="1867" dirty="0"/>
+              <a:t>Automate pilot job submission</a:t>
+            </a:r>
+          </a:p>
+          <a:p>
+            <a:pPr lvl="1"/>
+            <a:br>
+              <a:rPr lang="en-US" sz="1867" dirty="0"/>
+            </a:br>
+            <a:endParaRPr lang="en-US" sz="1867" dirty="0"/>
+          </a:p>
+          <a:p>
+            <a:endParaRPr lang="en-US" sz="2133" dirty="0"/>
+          </a:p>
+          <a:p>
+            <a:pPr marL="381003" indent="-381003">
+              <a:buFont typeface="Wingdings" panose="05000000000000000000" pitchFamily="2" charset="2"/>
+              <a:buChar char="ü"/>
+            </a:pPr>
+            <a:endParaRPr lang="LID4096" sz="2133" dirty="0"/>
+          </a:p>
+        </p:txBody>
+      </p:sp>
+      <p:sp>
+        <p:nvSpPr>
+          <p:cNvPr id="11" name="TextBox 10">
+            <a:extLst>
+              <a:ext uri="{FF2B5EF4-FFF2-40B4-BE49-F238E27FC236}">
+                <a16:creationId xmlns:a16="http://schemas.microsoft.com/office/drawing/2014/main" id="{E16F2E4D-4590-1A60-CE79-E437BA4723C3}"/>
+              </a:ext>
+            </a:extLst>
+          </p:cNvPr>
+          <p:cNvSpPr txBox="1"/>
+          <p:nvPr/>
+        </p:nvSpPr>
+        <p:spPr>
+          <a:xfrm>
+            <a:off x="478641" y="739111"/>
+            <a:ext cx="6434710" cy="369332"/>
+          </a:xfrm>
+          <a:prstGeom prst="rect">
+            <a:avLst/>
+          </a:prstGeom>
+          <a:noFill/>
+        </p:spPr>
+        <p:txBody>
+          <a:bodyPr wrap="none" rtlCol="0">
+            <a:spAutoFit/>
+          </a:bodyPr>
+          <a:lstStyle/>
+          <a:p>
+            <a:r>
+              <a:rPr lang="en-US" dirty="0"/>
+              <a:t>The following are the remaining tasks from WebApp and Backend</a:t>
+            </a:r>
+            <a:endParaRPr lang="LID4096" dirty="0"/>
+          </a:p>
+        </p:txBody>
+      </p:sp>
+    </p:spTree>
+    <p:extLst>
+      <p:ext uri="{BB962C8B-B14F-4D97-AF65-F5344CB8AC3E}">
+        <p14:creationId xmlns:p14="http://schemas.microsoft.com/office/powerpoint/2010/main" val="2800299129"/>
+      </p:ext>
+    </p:extLst>
+  </p:cSld>
+  <p:clrMapOvr>
+    <a:masterClrMapping/>
+  </p:clrMapOvr>
+  <mc:AlternateContent xmlns:mc="http://schemas.openxmlformats.org/markup-compatibility/2006" xmlns:p14="http://schemas.microsoft.com/office/powerpoint/2010/main">
+    <mc:Choice Requires="p14">
+      <p:transition spd="med" p14:dur="700">
+        <p:fade/>
+      </p:transition>
+    </mc:Choice>
+    <mc:Fallback xmlns="">
+      <p:transition spd="med">
+        <p:fade/>
+      </p:transition>
+    </mc:Fallback>
+  </mc:AlternateContent>
+</p:sld>
+</file>
+
+<file path=ppt/slides/slide8.xml><?xml version="1.0" encoding="utf-8"?>
+<p:sld xmlns:a="http://schemas.openxmlformats.org/drawingml/2006/main" xmlns:r="http://schemas.openxmlformats.org/officeDocument/2006/relationships" xmlns:p="http://schemas.openxmlformats.org/presentationml/2006/main">
+  <p:cSld>
+    <p:spTree>
+      <p:nvGrpSpPr>
+        <p:cNvPr id="1" name=""/>
+        <p:cNvGrpSpPr/>
+        <p:nvPr/>
+      </p:nvGrpSpPr>
+      <p:grpSpPr>
+        <a:xfrm>
+          <a:off x="0" y="0"/>
+          <a:ext cx="0" cy="0"/>
+          <a:chOff x="0" y="0"/>
+          <a:chExt cx="0" cy="0"/>
+        </a:xfrm>
+      </p:grpSpPr>
+      <p:pic>
+        <p:nvPicPr>
+          <p:cNvPr id="5" name="Content Placeholder 5">
+            <a:extLst>
+              <a:ext uri="{FF2B5EF4-FFF2-40B4-BE49-F238E27FC236}">
+                <a16:creationId xmlns:a16="http://schemas.microsoft.com/office/drawing/2014/main" id="{A8C9261E-9AB2-5FC2-1EED-856C6C8F2BF8}"/>
+              </a:ext>
+            </a:extLst>
+          </p:cNvPr>
+          <p:cNvPicPr>
+            <a:picLocks noChangeAspect="1"/>
+          </p:cNvPicPr>
+          <p:nvPr/>
+        </p:nvPicPr>
+        <p:blipFill>
+          <a:blip r:embed="rId2"/>
+          <a:stretch>
+            <a:fillRect/>
+          </a:stretch>
+        </p:blipFill>
+        <p:spPr>
+          <a:xfrm>
+            <a:off x="12179100" y="6320245"/>
+            <a:ext cx="643777" cy="487304"/>
+          </a:xfrm>
+          <a:prstGeom prst="rect">
+            <a:avLst/>
+          </a:prstGeom>
+        </p:spPr>
+      </p:pic>
+      <p:sp>
+        <p:nvSpPr>
+          <p:cNvPr id="6" name="Title 1">
+            <a:extLst>
+              <a:ext uri="{FF2B5EF4-FFF2-40B4-BE49-F238E27FC236}">
+                <a16:creationId xmlns:a16="http://schemas.microsoft.com/office/drawing/2014/main" id="{A56377DB-5151-6A4B-2584-F5511BBED9A5}"/>
+              </a:ext>
+            </a:extLst>
+          </p:cNvPr>
+          <p:cNvSpPr>
+            <a:spLocks noGrp="1"/>
+          </p:cNvSpPr>
+          <p:nvPr>
+            <p:ph type="title"/>
+          </p:nvPr>
+        </p:nvSpPr>
+        <p:spPr>
+          <a:xfrm>
+            <a:off x="478641" y="15030"/>
+            <a:ext cx="9874044" cy="443000"/>
+          </a:xfrm>
+        </p:spPr>
+        <p:txBody>
+          <a:bodyPr>
+            <a:normAutofit/>
+          </a:bodyPr>
+          <a:lstStyle/>
+          <a:p>
+            <a:r>
+              <a:rPr lang="en-US" sz="1314" b="1" dirty="0">
+                <a:solidFill>
+                  <a:schemeClr val="accent1"/>
+                </a:solidFill>
+                <a:latin typeface="Avenir Next" panose="020B0503020202020204" pitchFamily="34" charset="0"/>
+              </a:rPr>
               <a:t>Plan for next week</a:t>
             </a:r>
             <a:endParaRPr lang="en-NL" sz="1314" b="1" dirty="0">
@@ -12415,13 +13899,13 @@
   <p:clrMapOvr>
     <a:masterClrMapping/>
   </p:clrMapOvr>
-  <mc:AlternateContent xmlns:mc="http://schemas.openxmlformats.org/markup-compatibility/2006">
-    <mc:Choice xmlns:p14="http://schemas.microsoft.com/office/powerpoint/2010/main" Requires="p14">
+  <mc:AlternateContent xmlns:mc="http://schemas.openxmlformats.org/markup-compatibility/2006" xmlns:p14="http://schemas.microsoft.com/office/powerpoint/2010/main">
+    <mc:Choice Requires="p14">
       <p:transition spd="med" p14:dur="700">
         <p:fade/>
       </p:transition>
     </mc:Choice>
-    <mc:Fallback>
+    <mc:Fallback xmlns="">
       <p:transition spd="med">
         <p:fade/>
       </p:transition>
@@ -12430,7 +13914,7 @@
 </p:sld>
 </file>
 
-<file path=ppt/slides/slide8.xml><?xml version="1.0" encoding="utf-8"?>
+<file path=ppt/slides/slide9.xml><?xml version="1.0" encoding="utf-8"?>
 <p:sld xmlns:a="http://schemas.openxmlformats.org/drawingml/2006/main" xmlns:r="http://schemas.openxmlformats.org/officeDocument/2006/relationships" xmlns:p="http://schemas.openxmlformats.org/presentationml/2006/main">
   <p:cSld>
     <p:spTree>
@@ -13303,877 +14787,6 @@
     <p:extLst>
       <p:ext uri="{BB962C8B-B14F-4D97-AF65-F5344CB8AC3E}">
         <p14:creationId xmlns:p14="http://schemas.microsoft.com/office/powerpoint/2010/main" val="3051334494"/>
-      </p:ext>
-    </p:extLst>
-  </p:cSld>
-  <p:clrMapOvr>
-    <a:masterClrMapping/>
-  </p:clrMapOvr>
-  <mc:AlternateContent xmlns:mc="http://schemas.openxmlformats.org/markup-compatibility/2006" xmlns:p14="http://schemas.microsoft.com/office/powerpoint/2010/main">
-    <mc:Choice Requires="p14">
-      <p:transition spd="med" p14:dur="700">
-        <p:fade/>
-      </p:transition>
-    </mc:Choice>
-    <mc:Fallback xmlns="">
-      <p:transition spd="med">
-        <p:fade/>
-      </p:transition>
-    </mc:Fallback>
-  </mc:AlternateContent>
-</p:sld>
-</file>
-
-<file path=ppt/slides/slide9.xml><?xml version="1.0" encoding="utf-8"?>
-<p:sld xmlns:a="http://schemas.openxmlformats.org/drawingml/2006/main" xmlns:r="http://schemas.openxmlformats.org/officeDocument/2006/relationships" xmlns:p="http://schemas.openxmlformats.org/presentationml/2006/main">
-  <p:cSld>
-    <p:spTree>
-      <p:nvGrpSpPr>
-        <p:cNvPr id="1" name=""/>
-        <p:cNvGrpSpPr/>
-        <p:nvPr/>
-      </p:nvGrpSpPr>
-      <p:grpSpPr>
-        <a:xfrm>
-          <a:off x="0" y="0"/>
-          <a:ext cx="0" cy="0"/>
-          <a:chOff x="0" y="0"/>
-          <a:chExt cx="0" cy="0"/>
-        </a:xfrm>
-      </p:grpSpPr>
-      <p:sp>
-        <p:nvSpPr>
-          <p:cNvPr id="6" name="TextBox 5">
-            <a:extLst>
-              <a:ext uri="{FF2B5EF4-FFF2-40B4-BE49-F238E27FC236}">
-                <a16:creationId xmlns:a16="http://schemas.microsoft.com/office/drawing/2014/main" id="{FC12FC0C-6C8F-7413-1D65-C4DE01BC4013}"/>
-              </a:ext>
-            </a:extLst>
-          </p:cNvPr>
-          <p:cNvSpPr txBox="1"/>
-          <p:nvPr/>
-        </p:nvSpPr>
-        <p:spPr>
-          <a:xfrm>
-            <a:off x="853282" y="824754"/>
-            <a:ext cx="8606117" cy="1323439"/>
-          </a:xfrm>
-          <a:prstGeom prst="rect">
-            <a:avLst/>
-          </a:prstGeom>
-          <a:noFill/>
-        </p:spPr>
-        <p:txBody>
-          <a:bodyPr wrap="square" rtlCol="0">
-            <a:spAutoFit/>
-          </a:bodyPr>
-          <a:lstStyle/>
-          <a:p>
-            <a:r>
-              <a:rPr lang="en-US" sz="1600" b="1" dirty="0"/>
-              <a:t>Milestone 1:  Compatibility and shareability </a:t>
-            </a:r>
-          </a:p>
-          <a:p>
-            <a:r>
-              <a:rPr lang="en-US" sz="1600" dirty="0"/>
-              <a:t>Deliverable</a:t>
-            </a:r>
-            <a:r>
-              <a:rPr lang="en-US" sz="1600" b="1" dirty="0"/>
-              <a:t>:</a:t>
-            </a:r>
-          </a:p>
-          <a:p>
-            <a:pPr marL="990607" lvl="1" indent="-381003">
-              <a:buFont typeface="Arial" panose="020B0604020202020204" pitchFamily="34" charset="0"/>
-              <a:buChar char="•"/>
-            </a:pPr>
-            <a:r>
-              <a:rPr lang="en-US" sz="1600" dirty="0"/>
-              <a:t>Prepare images for models (models of computer vision group)</a:t>
-            </a:r>
-          </a:p>
-          <a:p>
-            <a:pPr marL="990607" lvl="1" indent="-381003">
-              <a:buFont typeface="Arial" panose="020B0604020202020204" pitchFamily="34" charset="0"/>
-              <a:buChar char="•"/>
-            </a:pPr>
-            <a:r>
-              <a:rPr lang="en-US" sz="1600" dirty="0"/>
-              <a:t>Short report (Guideline)</a:t>
-            </a:r>
-          </a:p>
-          <a:p>
-            <a:pPr marL="990607" lvl="1" indent="-381003">
-              <a:buFont typeface="Arial" panose="020B0604020202020204" pitchFamily="34" charset="0"/>
-              <a:buChar char="•"/>
-            </a:pPr>
-            <a:r>
-              <a:rPr lang="en-US" sz="1600" b="1" dirty="0"/>
-              <a:t>Deadline</a:t>
-            </a:r>
-            <a:r>
-              <a:rPr lang="en-US" sz="1600" dirty="0"/>
-              <a:t>:  Jan  8</a:t>
-            </a:r>
-          </a:p>
-        </p:txBody>
-      </p:sp>
-      <p:sp>
-        <p:nvSpPr>
-          <p:cNvPr id="7" name="TextBox 6">
-            <a:extLst>
-              <a:ext uri="{FF2B5EF4-FFF2-40B4-BE49-F238E27FC236}">
-                <a16:creationId xmlns:a16="http://schemas.microsoft.com/office/drawing/2014/main" id="{0F16D2B6-A3F1-EAA5-06E4-5E79390D41AA}"/>
-              </a:ext>
-            </a:extLst>
-          </p:cNvPr>
-          <p:cNvSpPr txBox="1"/>
-          <p:nvPr/>
-        </p:nvSpPr>
-        <p:spPr>
-          <a:xfrm>
-            <a:off x="814889" y="2453912"/>
-            <a:ext cx="9352568" cy="1323439"/>
-          </a:xfrm>
-          <a:prstGeom prst="rect">
-            <a:avLst/>
-          </a:prstGeom>
-          <a:noFill/>
-        </p:spPr>
-        <p:txBody>
-          <a:bodyPr wrap="square" rtlCol="0">
-            <a:spAutoFit/>
-          </a:bodyPr>
-          <a:lstStyle/>
-          <a:p>
-            <a:r>
-              <a:rPr lang="en-US" sz="1600" b="1" dirty="0"/>
-              <a:t>Milestone 2:  </a:t>
-            </a:r>
-            <a:r>
-              <a:rPr lang="en-US" sz="1600" b="1" dirty="0" err="1"/>
-              <a:t>PiCas</a:t>
-            </a:r>
-            <a:r>
-              <a:rPr lang="en-US" sz="1600" b="1" dirty="0"/>
-              <a:t> integration</a:t>
-            </a:r>
-          </a:p>
-          <a:p>
-            <a:r>
-              <a:rPr lang="en-US" sz="1600" dirty="0"/>
-              <a:t>Deliverables</a:t>
-            </a:r>
-            <a:r>
-              <a:rPr lang="en-US" sz="1600" b="1" dirty="0"/>
-              <a:t>:</a:t>
-            </a:r>
-          </a:p>
-          <a:p>
-            <a:pPr marL="990607" lvl="1" indent="-381003">
-              <a:buFont typeface="Arial" panose="020B0604020202020204" pitchFamily="34" charset="0"/>
-              <a:buChar char="•"/>
-            </a:pPr>
-            <a:r>
-              <a:rPr lang="en-US" sz="1600" dirty="0"/>
-              <a:t>Prepare different pilot jobs according to user needs</a:t>
-            </a:r>
-          </a:p>
-          <a:p>
-            <a:pPr marL="990607" lvl="1" indent="-381003">
-              <a:buFont typeface="Arial" panose="020B0604020202020204" pitchFamily="34" charset="0"/>
-              <a:buChar char="•"/>
-            </a:pPr>
-            <a:r>
-              <a:rPr lang="en-US" sz="1600" dirty="0"/>
-              <a:t>Automate (partly) pilot job submission</a:t>
-            </a:r>
-          </a:p>
-          <a:p>
-            <a:pPr marL="990607" lvl="1" indent="-381003">
-              <a:buFont typeface="Arial" panose="020B0604020202020204" pitchFamily="34" charset="0"/>
-              <a:buChar char="•"/>
-            </a:pPr>
-            <a:r>
-              <a:rPr lang="en-US" sz="1600" b="1" dirty="0"/>
-              <a:t>Deadline</a:t>
-            </a:r>
-            <a:r>
-              <a:rPr lang="en-US" sz="1600" dirty="0"/>
-              <a:t>:  Jan 30 </a:t>
-            </a:r>
-          </a:p>
-        </p:txBody>
-      </p:sp>
-      <p:sp>
-        <p:nvSpPr>
-          <p:cNvPr id="8" name="TextBox 7">
-            <a:extLst>
-              <a:ext uri="{FF2B5EF4-FFF2-40B4-BE49-F238E27FC236}">
-                <a16:creationId xmlns:a16="http://schemas.microsoft.com/office/drawing/2014/main" id="{91CD3A47-0EB8-625D-9DBF-571A8DFB0B04}"/>
-              </a:ext>
-            </a:extLst>
-          </p:cNvPr>
-          <p:cNvSpPr txBox="1"/>
-          <p:nvPr/>
-        </p:nvSpPr>
-        <p:spPr>
-          <a:xfrm>
-            <a:off x="724368" y="4160825"/>
-            <a:ext cx="8606117" cy="1077218"/>
-          </a:xfrm>
-          <a:prstGeom prst="rect">
-            <a:avLst/>
-          </a:prstGeom>
-          <a:noFill/>
-        </p:spPr>
-        <p:txBody>
-          <a:bodyPr wrap="square" rtlCol="0">
-            <a:spAutoFit/>
-          </a:bodyPr>
-          <a:lstStyle/>
-          <a:p>
-            <a:r>
-              <a:rPr lang="en-US" sz="1600" b="1" dirty="0"/>
-              <a:t>Milestone 3:  Web-application</a:t>
-            </a:r>
-          </a:p>
-          <a:p>
-            <a:r>
-              <a:rPr lang="en-US" sz="1600" dirty="0"/>
-              <a:t>Deliverable</a:t>
-            </a:r>
-            <a:r>
-              <a:rPr lang="en-US" sz="1600" b="1" dirty="0"/>
-              <a:t>:</a:t>
-            </a:r>
-          </a:p>
-          <a:p>
-            <a:pPr marL="990607" lvl="1" indent="-381003">
-              <a:buFont typeface="Arial" panose="020B0604020202020204" pitchFamily="34" charset="0"/>
-              <a:buChar char="•"/>
-            </a:pPr>
-            <a:r>
-              <a:rPr lang="en-US" sz="1600" dirty="0"/>
-              <a:t>Complete remaining tasks </a:t>
-            </a:r>
-          </a:p>
-          <a:p>
-            <a:pPr marL="990607" lvl="1" indent="-381003">
-              <a:buFont typeface="Arial" panose="020B0604020202020204" pitchFamily="34" charset="0"/>
-              <a:buChar char="•"/>
-            </a:pPr>
-            <a:r>
-              <a:rPr lang="en-US" sz="1600" b="1" dirty="0"/>
-              <a:t>Deadline</a:t>
-            </a:r>
-            <a:r>
-              <a:rPr lang="en-US" sz="1600" dirty="0"/>
-              <a:t>:  Feb 15 </a:t>
-            </a:r>
-          </a:p>
-        </p:txBody>
-      </p:sp>
-      <p:graphicFrame>
-        <p:nvGraphicFramePr>
-          <p:cNvPr id="9" name="Diagram 8">
-            <a:extLst>
-              <a:ext uri="{FF2B5EF4-FFF2-40B4-BE49-F238E27FC236}">
-                <a16:creationId xmlns:a16="http://schemas.microsoft.com/office/drawing/2014/main" id="{026BB30E-2595-144D-905F-AF10D6572A09}"/>
-              </a:ext>
-            </a:extLst>
-          </p:cNvPr>
-          <p:cNvGraphicFramePr/>
-          <p:nvPr>
-            <p:extLst>
-              <p:ext uri="{D42A27DB-BD31-4B8C-83A1-F6EECF244321}">
-                <p14:modId xmlns:p14="http://schemas.microsoft.com/office/powerpoint/2010/main" val="418463686"/>
-              </p:ext>
-            </p:extLst>
-          </p:nvPr>
-        </p:nvGraphicFramePr>
-        <p:xfrm>
-          <a:off x="787302" y="6411242"/>
-          <a:ext cx="11401902" cy="232066"/>
-        </p:xfrm>
-        <a:graphic>
-          <a:graphicData uri="http://schemas.openxmlformats.org/drawingml/2006/diagram">
-            <dgm:relIds xmlns:dgm="http://schemas.openxmlformats.org/drawingml/2006/diagram" xmlns:r="http://schemas.openxmlformats.org/officeDocument/2006/relationships" r:dm="rId2" r:lo="rId3" r:qs="rId4" r:cs="rId5"/>
-          </a:graphicData>
-        </a:graphic>
-      </p:graphicFrame>
-      <p:sp>
-        <p:nvSpPr>
-          <p:cNvPr id="10" name="Arrow: Down 9">
-            <a:extLst>
-              <a:ext uri="{FF2B5EF4-FFF2-40B4-BE49-F238E27FC236}">
-                <a16:creationId xmlns:a16="http://schemas.microsoft.com/office/drawing/2014/main" id="{627423EE-9F76-298C-A776-0AF9A7E5E9B4}"/>
-              </a:ext>
-            </a:extLst>
-          </p:cNvPr>
-          <p:cNvSpPr/>
-          <p:nvPr/>
-        </p:nvSpPr>
-        <p:spPr>
-          <a:xfrm>
-            <a:off x="9799354" y="6156717"/>
-            <a:ext cx="130469" cy="253006"/>
-          </a:xfrm>
-          <a:prstGeom prst="downArrow">
-            <a:avLst/>
-          </a:prstGeom>
-        </p:spPr>
-        <p:style>
-          <a:lnRef idx="2">
-            <a:schemeClr val="accent1">
-              <a:shade val="50000"/>
-            </a:schemeClr>
-          </a:lnRef>
-          <a:fillRef idx="1">
-            <a:schemeClr val="accent1"/>
-          </a:fillRef>
-          <a:effectRef idx="0">
-            <a:schemeClr val="accent1"/>
-          </a:effectRef>
-          <a:fontRef idx="minor">
-            <a:schemeClr val="lt1"/>
-          </a:fontRef>
-        </p:style>
-        <p:txBody>
-          <a:bodyPr rtlCol="0" anchor="ctr"/>
-          <a:lstStyle/>
-          <a:p>
-            <a:pPr algn="ctr"/>
-            <a:endParaRPr lang="LID4096" sz="2842"/>
-          </a:p>
-        </p:txBody>
-      </p:sp>
-      <p:sp>
-        <p:nvSpPr>
-          <p:cNvPr id="11" name="TextBox 10">
-            <a:extLst>
-              <a:ext uri="{FF2B5EF4-FFF2-40B4-BE49-F238E27FC236}">
-                <a16:creationId xmlns:a16="http://schemas.microsoft.com/office/drawing/2014/main" id="{8BFAAACE-7346-702F-3590-5FC74D6DAED9}"/>
-              </a:ext>
-            </a:extLst>
-          </p:cNvPr>
-          <p:cNvSpPr txBox="1"/>
-          <p:nvPr/>
-        </p:nvSpPr>
-        <p:spPr>
-          <a:xfrm>
-            <a:off x="8541949" y="5792588"/>
-            <a:ext cx="901695" cy="256352"/>
-          </a:xfrm>
-          <a:prstGeom prst="rect">
-            <a:avLst/>
-          </a:prstGeom>
-          <a:noFill/>
-        </p:spPr>
-        <p:txBody>
-          <a:bodyPr wrap="square" rtlCol="0">
-            <a:spAutoFit/>
-          </a:bodyPr>
-          <a:lstStyle/>
-          <a:p>
-            <a:r>
-              <a:rPr lang="en-US" sz="1066" b="1" dirty="0"/>
-              <a:t>Milestone 3</a:t>
-            </a:r>
-          </a:p>
-        </p:txBody>
-      </p:sp>
-      <p:sp>
-        <p:nvSpPr>
-          <p:cNvPr id="12" name="Arrow: Down 11">
-            <a:extLst>
-              <a:ext uri="{FF2B5EF4-FFF2-40B4-BE49-F238E27FC236}">
-                <a16:creationId xmlns:a16="http://schemas.microsoft.com/office/drawing/2014/main" id="{02E116A1-004A-5085-69AB-6723D3131ACE}"/>
-              </a:ext>
-            </a:extLst>
-          </p:cNvPr>
-          <p:cNvSpPr/>
-          <p:nvPr/>
-        </p:nvSpPr>
-        <p:spPr>
-          <a:xfrm>
-            <a:off x="7942852" y="6148534"/>
-            <a:ext cx="103282" cy="253006"/>
-          </a:xfrm>
-          <a:prstGeom prst="downArrow">
-            <a:avLst/>
-          </a:prstGeom>
-        </p:spPr>
-        <p:style>
-          <a:lnRef idx="2">
-            <a:schemeClr val="accent1">
-              <a:shade val="50000"/>
-            </a:schemeClr>
-          </a:lnRef>
-          <a:fillRef idx="1">
-            <a:schemeClr val="accent1"/>
-          </a:fillRef>
-          <a:effectRef idx="0">
-            <a:schemeClr val="accent1"/>
-          </a:effectRef>
-          <a:fontRef idx="minor">
-            <a:schemeClr val="lt1"/>
-          </a:fontRef>
-        </p:style>
-        <p:txBody>
-          <a:bodyPr rtlCol="0" anchor="ctr"/>
-          <a:lstStyle/>
-          <a:p>
-            <a:pPr algn="ctr"/>
-            <a:endParaRPr lang="LID4096" sz="2842"/>
-          </a:p>
-        </p:txBody>
-      </p:sp>
-      <p:sp>
-        <p:nvSpPr>
-          <p:cNvPr id="13" name="Arrow: Down 12">
-            <a:extLst>
-              <a:ext uri="{FF2B5EF4-FFF2-40B4-BE49-F238E27FC236}">
-                <a16:creationId xmlns:a16="http://schemas.microsoft.com/office/drawing/2014/main" id="{ADEDC7DD-729B-7594-E5F0-973D1268DA2C}"/>
-              </a:ext>
-            </a:extLst>
-          </p:cNvPr>
-          <p:cNvSpPr/>
-          <p:nvPr/>
-        </p:nvSpPr>
-        <p:spPr>
-          <a:xfrm>
-            <a:off x="11468540" y="6145157"/>
-            <a:ext cx="130469" cy="259732"/>
-          </a:xfrm>
-          <a:prstGeom prst="downArrow">
-            <a:avLst/>
-          </a:prstGeom>
-        </p:spPr>
-        <p:style>
-          <a:lnRef idx="2">
-            <a:schemeClr val="accent1">
-              <a:shade val="50000"/>
-            </a:schemeClr>
-          </a:lnRef>
-          <a:fillRef idx="1">
-            <a:schemeClr val="accent1"/>
-          </a:fillRef>
-          <a:effectRef idx="0">
-            <a:schemeClr val="accent1"/>
-          </a:effectRef>
-          <a:fontRef idx="minor">
-            <a:schemeClr val="lt1"/>
-          </a:fontRef>
-        </p:style>
-        <p:txBody>
-          <a:bodyPr rtlCol="0" anchor="ctr"/>
-          <a:lstStyle/>
-          <a:p>
-            <a:pPr algn="ctr"/>
-            <a:endParaRPr lang="LID4096" sz="2842" dirty="0"/>
-          </a:p>
-        </p:txBody>
-      </p:sp>
-      <p:sp>
-        <p:nvSpPr>
-          <p:cNvPr id="14" name="Arrow: Down 13">
-            <a:extLst>
-              <a:ext uri="{FF2B5EF4-FFF2-40B4-BE49-F238E27FC236}">
-                <a16:creationId xmlns:a16="http://schemas.microsoft.com/office/drawing/2014/main" id="{CC5682FB-57D2-9990-DED1-DC9A3A54DB7B}"/>
-              </a:ext>
-            </a:extLst>
-          </p:cNvPr>
-          <p:cNvSpPr/>
-          <p:nvPr/>
-        </p:nvSpPr>
-        <p:spPr>
-          <a:xfrm>
-            <a:off x="8939660" y="6145157"/>
-            <a:ext cx="130471" cy="253006"/>
-          </a:xfrm>
-          <a:prstGeom prst="downArrow">
-            <a:avLst/>
-          </a:prstGeom>
-        </p:spPr>
-        <p:style>
-          <a:lnRef idx="2">
-            <a:schemeClr val="accent1">
-              <a:shade val="50000"/>
-            </a:schemeClr>
-          </a:lnRef>
-          <a:fillRef idx="1">
-            <a:schemeClr val="accent1"/>
-          </a:fillRef>
-          <a:effectRef idx="0">
-            <a:schemeClr val="accent1"/>
-          </a:effectRef>
-          <a:fontRef idx="minor">
-            <a:schemeClr val="lt1"/>
-          </a:fontRef>
-        </p:style>
-        <p:txBody>
-          <a:bodyPr rtlCol="0" anchor="ctr"/>
-          <a:lstStyle/>
-          <a:p>
-            <a:pPr algn="ctr"/>
-            <a:endParaRPr lang="LID4096" sz="2842"/>
-          </a:p>
-        </p:txBody>
-      </p:sp>
-      <p:sp>
-        <p:nvSpPr>
-          <p:cNvPr id="15" name="Arrow: Down 14">
-            <a:extLst>
-              <a:ext uri="{FF2B5EF4-FFF2-40B4-BE49-F238E27FC236}">
-                <a16:creationId xmlns:a16="http://schemas.microsoft.com/office/drawing/2014/main" id="{38128599-CFAC-71B8-0953-CEBAB0C4194A}"/>
-              </a:ext>
-            </a:extLst>
-          </p:cNvPr>
-          <p:cNvSpPr/>
-          <p:nvPr/>
-        </p:nvSpPr>
-        <p:spPr>
-          <a:xfrm>
-            <a:off x="3826135" y="6124883"/>
-            <a:ext cx="130469" cy="284840"/>
-          </a:xfrm>
-          <a:prstGeom prst="downArrow">
-            <a:avLst/>
-          </a:prstGeom>
-        </p:spPr>
-        <p:style>
-          <a:lnRef idx="2">
-            <a:schemeClr val="accent1">
-              <a:shade val="50000"/>
-            </a:schemeClr>
-          </a:lnRef>
-          <a:fillRef idx="1">
-            <a:schemeClr val="accent1"/>
-          </a:fillRef>
-          <a:effectRef idx="0">
-            <a:schemeClr val="accent1"/>
-          </a:effectRef>
-          <a:fontRef idx="minor">
-            <a:schemeClr val="lt1"/>
-          </a:fontRef>
-        </p:style>
-        <p:txBody>
-          <a:bodyPr rtlCol="0" anchor="ctr"/>
-          <a:lstStyle/>
-          <a:p>
-            <a:pPr algn="ctr"/>
-            <a:endParaRPr lang="LID4096" sz="2842" dirty="0"/>
-          </a:p>
-        </p:txBody>
-      </p:sp>
-      <p:sp>
-        <p:nvSpPr>
-          <p:cNvPr id="16" name="TextBox 15">
-            <a:extLst>
-              <a:ext uri="{FF2B5EF4-FFF2-40B4-BE49-F238E27FC236}">
-                <a16:creationId xmlns:a16="http://schemas.microsoft.com/office/drawing/2014/main" id="{0C454734-DA28-DAFB-0320-8DF036A5FBCA}"/>
-              </a:ext>
-            </a:extLst>
-          </p:cNvPr>
-          <p:cNvSpPr txBox="1"/>
-          <p:nvPr/>
-        </p:nvSpPr>
-        <p:spPr>
-          <a:xfrm>
-            <a:off x="7482029" y="5792588"/>
-            <a:ext cx="1116197" cy="256352"/>
-          </a:xfrm>
-          <a:prstGeom prst="rect">
-            <a:avLst/>
-          </a:prstGeom>
-          <a:noFill/>
-        </p:spPr>
-        <p:txBody>
-          <a:bodyPr wrap="square" rtlCol="0">
-            <a:spAutoFit/>
-          </a:bodyPr>
-          <a:lstStyle/>
-          <a:p>
-            <a:r>
-              <a:rPr lang="en-US" sz="1066" b="1" dirty="0"/>
-              <a:t>Milestone 2</a:t>
-            </a:r>
-          </a:p>
-        </p:txBody>
-      </p:sp>
-      <p:sp>
-        <p:nvSpPr>
-          <p:cNvPr id="17" name="TextBox 16">
-            <a:extLst>
-              <a:ext uri="{FF2B5EF4-FFF2-40B4-BE49-F238E27FC236}">
-                <a16:creationId xmlns:a16="http://schemas.microsoft.com/office/drawing/2014/main" id="{2CB85634-327C-AD4A-5514-A00BC1EC5B32}"/>
-              </a:ext>
-            </a:extLst>
-          </p:cNvPr>
-          <p:cNvSpPr txBox="1"/>
-          <p:nvPr/>
-        </p:nvSpPr>
-        <p:spPr>
-          <a:xfrm>
-            <a:off x="11073006" y="5615387"/>
-            <a:ext cx="2232395" cy="420371"/>
-          </a:xfrm>
-          <a:prstGeom prst="rect">
-            <a:avLst/>
-          </a:prstGeom>
-          <a:noFill/>
-        </p:spPr>
-        <p:txBody>
-          <a:bodyPr wrap="square" rtlCol="0">
-            <a:spAutoFit/>
-          </a:bodyPr>
-          <a:lstStyle/>
-          <a:p>
-            <a:r>
-              <a:rPr lang="en-US" sz="1066" b="1" dirty="0"/>
-              <a:t>Defense and </a:t>
-            </a:r>
-          </a:p>
-          <a:p>
-            <a:r>
-              <a:rPr lang="en-US" sz="1066" b="1" dirty="0"/>
-              <a:t>final presentation</a:t>
-            </a:r>
-            <a:endParaRPr lang="LID4096" sz="1066" b="1" dirty="0"/>
-          </a:p>
-        </p:txBody>
-      </p:sp>
-      <p:sp>
-        <p:nvSpPr>
-          <p:cNvPr id="18" name="TextBox 17">
-            <a:extLst>
-              <a:ext uri="{FF2B5EF4-FFF2-40B4-BE49-F238E27FC236}">
-                <a16:creationId xmlns:a16="http://schemas.microsoft.com/office/drawing/2014/main" id="{330DBA8E-B834-78E2-73E0-75ACD2A4DE25}"/>
-              </a:ext>
-            </a:extLst>
-          </p:cNvPr>
-          <p:cNvSpPr txBox="1"/>
-          <p:nvPr/>
-        </p:nvSpPr>
-        <p:spPr>
-          <a:xfrm>
-            <a:off x="9495588" y="5808998"/>
-            <a:ext cx="2232395" cy="256352"/>
-          </a:xfrm>
-          <a:prstGeom prst="rect">
-            <a:avLst/>
-          </a:prstGeom>
-          <a:noFill/>
-        </p:spPr>
-        <p:txBody>
-          <a:bodyPr wrap="square" rtlCol="0">
-            <a:spAutoFit/>
-          </a:bodyPr>
-          <a:lstStyle/>
-          <a:p>
-            <a:r>
-              <a:rPr lang="en-US" sz="1066" dirty="0">
-                <a:solidFill>
-                  <a:srgbClr val="0070C0"/>
-                </a:solidFill>
-              </a:rPr>
-              <a:t>Second draft(thesis)</a:t>
-            </a:r>
-            <a:endParaRPr lang="LID4096" sz="1066" dirty="0">
-              <a:solidFill>
-                <a:srgbClr val="0070C0"/>
-              </a:solidFill>
-            </a:endParaRPr>
-          </a:p>
-        </p:txBody>
-      </p:sp>
-      <p:sp>
-        <p:nvSpPr>
-          <p:cNvPr id="19" name="TextBox 18">
-            <a:extLst>
-              <a:ext uri="{FF2B5EF4-FFF2-40B4-BE49-F238E27FC236}">
-                <a16:creationId xmlns:a16="http://schemas.microsoft.com/office/drawing/2014/main" id="{E3274675-14E8-5124-8477-E6FEA1BBFF58}"/>
-              </a:ext>
-            </a:extLst>
-          </p:cNvPr>
-          <p:cNvSpPr txBox="1"/>
-          <p:nvPr/>
-        </p:nvSpPr>
-        <p:spPr>
-          <a:xfrm>
-            <a:off x="3441605" y="5831176"/>
-            <a:ext cx="2232395" cy="256352"/>
-          </a:xfrm>
-          <a:prstGeom prst="rect">
-            <a:avLst/>
-          </a:prstGeom>
-          <a:noFill/>
-        </p:spPr>
-        <p:txBody>
-          <a:bodyPr wrap="square" rtlCol="0">
-            <a:spAutoFit/>
-          </a:bodyPr>
-          <a:lstStyle/>
-          <a:p>
-            <a:r>
-              <a:rPr lang="en-US" sz="1066" dirty="0">
-                <a:solidFill>
-                  <a:srgbClr val="0070C0"/>
-                </a:solidFill>
-              </a:rPr>
-              <a:t>Initial draft(thesis)</a:t>
-            </a:r>
-            <a:endParaRPr lang="LID4096" sz="1066" dirty="0">
-              <a:solidFill>
-                <a:srgbClr val="0070C0"/>
-              </a:solidFill>
-            </a:endParaRPr>
-          </a:p>
-        </p:txBody>
-      </p:sp>
-      <p:sp>
-        <p:nvSpPr>
-          <p:cNvPr id="20" name="Arrow: Down 19">
-            <a:extLst>
-              <a:ext uri="{FF2B5EF4-FFF2-40B4-BE49-F238E27FC236}">
-                <a16:creationId xmlns:a16="http://schemas.microsoft.com/office/drawing/2014/main" id="{F2E9A6BA-B50A-D2F1-3FE9-E7908C35FD16}"/>
-              </a:ext>
-            </a:extLst>
-          </p:cNvPr>
-          <p:cNvSpPr/>
-          <p:nvPr/>
-        </p:nvSpPr>
-        <p:spPr>
-          <a:xfrm>
-            <a:off x="6541255" y="6133885"/>
-            <a:ext cx="130469" cy="253006"/>
-          </a:xfrm>
-          <a:prstGeom prst="downArrow">
-            <a:avLst/>
-          </a:prstGeom>
-        </p:spPr>
-        <p:style>
-          <a:lnRef idx="2">
-            <a:schemeClr val="accent1">
-              <a:shade val="50000"/>
-            </a:schemeClr>
-          </a:lnRef>
-          <a:fillRef idx="1">
-            <a:schemeClr val="accent1"/>
-          </a:fillRef>
-          <a:effectRef idx="0">
-            <a:schemeClr val="accent1"/>
-          </a:effectRef>
-          <a:fontRef idx="minor">
-            <a:schemeClr val="lt1"/>
-          </a:fontRef>
-        </p:style>
-        <p:txBody>
-          <a:bodyPr rtlCol="0" anchor="ctr"/>
-          <a:lstStyle/>
-          <a:p>
-            <a:pPr algn="ctr"/>
-            <a:endParaRPr lang="LID4096" sz="2842"/>
-          </a:p>
-        </p:txBody>
-      </p:sp>
-      <p:sp>
-        <p:nvSpPr>
-          <p:cNvPr id="21" name="TextBox 20">
-            <a:extLst>
-              <a:ext uri="{FF2B5EF4-FFF2-40B4-BE49-F238E27FC236}">
-                <a16:creationId xmlns:a16="http://schemas.microsoft.com/office/drawing/2014/main" id="{04D5EF8D-18E3-125E-E387-41311016932D}"/>
-              </a:ext>
-            </a:extLst>
-          </p:cNvPr>
-          <p:cNvSpPr txBox="1"/>
-          <p:nvPr/>
-        </p:nvSpPr>
-        <p:spPr>
-          <a:xfrm>
-            <a:off x="6135221" y="5799376"/>
-            <a:ext cx="2232395" cy="256352"/>
-          </a:xfrm>
-          <a:prstGeom prst="rect">
-            <a:avLst/>
-          </a:prstGeom>
-          <a:noFill/>
-        </p:spPr>
-        <p:txBody>
-          <a:bodyPr wrap="square" rtlCol="0">
-            <a:spAutoFit/>
-          </a:bodyPr>
-          <a:lstStyle/>
-          <a:p>
-            <a:r>
-              <a:rPr lang="en-US" sz="1066" b="1" dirty="0"/>
-              <a:t>Milestone 1</a:t>
-            </a:r>
-          </a:p>
-        </p:txBody>
-      </p:sp>
-      <p:sp>
-        <p:nvSpPr>
-          <p:cNvPr id="5" name="Title 1">
-            <a:extLst>
-              <a:ext uri="{FF2B5EF4-FFF2-40B4-BE49-F238E27FC236}">
-                <a16:creationId xmlns:a16="http://schemas.microsoft.com/office/drawing/2014/main" id="{AF136E46-224C-3612-21AF-8F58BE935AB3}"/>
-              </a:ext>
-            </a:extLst>
-          </p:cNvPr>
-          <p:cNvSpPr>
-            <a:spLocks noGrp="1"/>
-          </p:cNvSpPr>
-          <p:nvPr>
-            <p:ph type="title"/>
-          </p:nvPr>
-        </p:nvSpPr>
-        <p:spPr>
-          <a:xfrm>
-            <a:off x="478641" y="15030"/>
-            <a:ext cx="9874044" cy="443000"/>
-          </a:xfrm>
-        </p:spPr>
-        <p:txBody>
-          <a:bodyPr>
-            <a:normAutofit/>
-          </a:bodyPr>
-          <a:lstStyle/>
-          <a:p>
-            <a:r>
-              <a:rPr lang="en-US" sz="1314" b="1" dirty="0">
-                <a:solidFill>
-                  <a:schemeClr val="accent1"/>
-                </a:solidFill>
-                <a:latin typeface="Avenir Next" panose="020B0503020202020204" pitchFamily="34" charset="0"/>
-              </a:rPr>
-              <a:t>Project Plan and Milestones </a:t>
-            </a:r>
-            <a:r>
-              <a:rPr lang="en-US" sz="1314" b="1" dirty="0">
-                <a:solidFill>
-                  <a:srgbClr val="FF0000"/>
-                </a:solidFill>
-                <a:latin typeface="Avenir Next" panose="020B0503020202020204" pitchFamily="34" charset="0"/>
-              </a:rPr>
-              <a:t>(updated)</a:t>
-            </a:r>
-            <a:endParaRPr lang="en-NL" sz="1314" b="1" dirty="0">
-              <a:solidFill>
-                <a:srgbClr val="FF0000"/>
-              </a:solidFill>
-              <a:latin typeface="Avenir Next" panose="020B0503020202020204" pitchFamily="34" charset="0"/>
-            </a:endParaRPr>
-          </a:p>
-        </p:txBody>
-      </p:sp>
-    </p:spTree>
-    <p:extLst>
-      <p:ext uri="{BB962C8B-B14F-4D97-AF65-F5344CB8AC3E}">
-        <p14:creationId xmlns:p14="http://schemas.microsoft.com/office/powerpoint/2010/main" val="3013864476"/>
       </p:ext>
     </p:extLst>
   </p:cSld>

</xml_diff>

<commit_message>
slides for weekly meeting updated
</commit_message>
<xml_diff>
--- a/docs/surf_PiCas_Dec_05.pptx
+++ b/docs/surf_PiCas_Dec_05.pptx
@@ -11978,8 +11978,8 @@
         </p:nvSpPr>
         <p:spPr>
           <a:xfrm>
-            <a:off x="680250" y="6027857"/>
-            <a:ext cx="6920176" cy="584775"/>
+            <a:off x="655084" y="6222774"/>
+            <a:ext cx="6920176" cy="538609"/>
           </a:xfrm>
           <a:prstGeom prst="rect">
             <a:avLst/>
@@ -11993,11 +11993,11 @@
           <a:lstStyle/>
           <a:p>
             <a:r>
-              <a:rPr lang="en-US" sz="1400" dirty="0"/>
+              <a:rPr lang="en-US" sz="1100" dirty="0"/>
               <a:t>Implementation:   On GitHub -  </a:t>
             </a:r>
             <a:r>
-              <a:rPr lang="en-US" sz="1200" b="1" u="none" strike="noStrike" dirty="0">
+              <a:rPr lang="en-US" sz="1100" b="1" u="none" strike="noStrike" dirty="0">
                 <a:solidFill>
                   <a:schemeClr val="accent2"/>
                 </a:solidFill>
@@ -12013,7 +12013,7 @@
               <a:t>IMAGEN_Backend</a:t>
             </a:r>
             <a:r>
-              <a:rPr lang="en-US" sz="1200" b="0" dirty="0">
+              <a:rPr lang="en-US" sz="1100" b="0" dirty="0">
                 <a:solidFill>
                   <a:schemeClr val="accent2"/>
                 </a:solidFill>
@@ -12022,7 +12022,7 @@
               <a:t>/</a:t>
             </a:r>
             <a:r>
-              <a:rPr lang="en-US" sz="1200" b="0" u="none" strike="noStrike" dirty="0">
+              <a:rPr lang="en-US" sz="1100" b="0" u="none" strike="noStrike" dirty="0">
                 <a:solidFill>
                   <a:schemeClr val="accent2"/>
                 </a:solidFill>
@@ -12038,7 +12038,7 @@
               <a:t>picas_client</a:t>
             </a:r>
             <a:r>
-              <a:rPr lang="en-US" sz="1200" b="0" i="0" dirty="0">
+              <a:rPr lang="en-US" sz="1100" b="0" i="0" dirty="0">
                 <a:solidFill>
                   <a:schemeClr val="accent2"/>
                 </a:solidFill>
@@ -12047,7 +12047,7 @@
               <a:t>/</a:t>
             </a:r>
             <a:r>
-              <a:rPr lang="en-US" sz="1200" b="1" i="0" dirty="0">
+              <a:rPr lang="en-US" sz="1100" b="1" i="0" dirty="0">
                 <a:solidFill>
                   <a:schemeClr val="accent2"/>
                 </a:solidFill>
@@ -12687,18 +12687,123 @@
   <p:clrMapOvr>
     <a:masterClrMapping/>
   </p:clrMapOvr>
-  <mc:AlternateContent xmlns:mc="http://schemas.openxmlformats.org/markup-compatibility/2006">
-    <mc:Choice xmlns:p14="http://schemas.microsoft.com/office/powerpoint/2010/main" Requires="p14">
+  <mc:AlternateContent xmlns:mc="http://schemas.openxmlformats.org/markup-compatibility/2006" xmlns:p14="http://schemas.microsoft.com/office/powerpoint/2010/main">
+    <mc:Choice Requires="p14">
       <p:transition spd="med" p14:dur="700">
         <p:fade/>
       </p:transition>
     </mc:Choice>
-    <mc:Fallback>
+    <mc:Fallback xmlns="">
       <p:transition spd="med">
         <p:fade/>
       </p:transition>
     </mc:Fallback>
   </mc:AlternateContent>
+  <p:timing>
+    <p:tnLst>
+      <p:par>
+        <p:cTn id="1" dur="indefinite" restart="never" nodeType="tmRoot">
+          <p:childTnLst>
+            <p:seq concurrent="1" nextAc="seek">
+              <p:cTn id="2" dur="indefinite" nodeType="mainSeq">
+                <p:childTnLst>
+                  <p:par>
+                    <p:cTn id="3" fill="hold">
+                      <p:stCondLst>
+                        <p:cond delay="indefinite"/>
+                      </p:stCondLst>
+                      <p:childTnLst>
+                        <p:par>
+                          <p:cTn id="4" fill="hold">
+                            <p:stCondLst>
+                              <p:cond delay="0"/>
+                            </p:stCondLst>
+                            <p:childTnLst>
+                              <p:par>
+                                <p:cTn id="5" presetID="1" presetClass="entr" presetSubtype="0" fill="hold" nodeType="clickEffect">
+                                  <p:stCondLst>
+                                    <p:cond delay="0"/>
+                                  </p:stCondLst>
+                                  <p:childTnLst>
+                                    <p:set>
+                                      <p:cBhvr>
+                                        <p:cTn id="6" dur="1" fill="hold">
+                                          <p:stCondLst>
+                                            <p:cond delay="0"/>
+                                          </p:stCondLst>
+                                        </p:cTn>
+                                        <p:tgtEl>
+                                          <p:spTgt spid="19"/>
+                                        </p:tgtEl>
+                                        <p:attrNameLst>
+                                          <p:attrName>style.visibility</p:attrName>
+                                        </p:attrNameLst>
+                                      </p:cBhvr>
+                                      <p:to>
+                                        <p:strVal val="visible"/>
+                                      </p:to>
+                                    </p:set>
+                                  </p:childTnLst>
+                                </p:cTn>
+                              </p:par>
+                              <p:par>
+                                <p:cTn id="7" presetID="1" presetClass="entr" presetSubtype="0" fill="hold" grpId="0" nodeType="withEffect">
+                                  <p:stCondLst>
+                                    <p:cond delay="0"/>
+                                  </p:stCondLst>
+                                  <p:childTnLst>
+                                    <p:set>
+                                      <p:cBhvr>
+                                        <p:cTn id="8" dur="1" fill="hold">
+                                          <p:stCondLst>
+                                            <p:cond delay="0"/>
+                                          </p:stCondLst>
+                                        </p:cTn>
+                                        <p:tgtEl>
+                                          <p:spTgt spid="3"/>
+                                        </p:tgtEl>
+                                        <p:attrNameLst>
+                                          <p:attrName>style.visibility</p:attrName>
+                                        </p:attrNameLst>
+                                      </p:cBhvr>
+                                      <p:to>
+                                        <p:strVal val="visible"/>
+                                      </p:to>
+                                    </p:set>
+                                  </p:childTnLst>
+                                </p:cTn>
+                              </p:par>
+                            </p:childTnLst>
+                          </p:cTn>
+                        </p:par>
+                      </p:childTnLst>
+                    </p:cTn>
+                  </p:par>
+                </p:childTnLst>
+              </p:cTn>
+              <p:prevCondLst>
+                <p:cond evt="onPrev" delay="0">
+                  <p:tgtEl>
+                    <p:sldTgt/>
+                  </p:tgtEl>
+                </p:cond>
+              </p:prevCondLst>
+              <p:nextCondLst>
+                <p:cond evt="onNext" delay="0">
+                  <p:tgtEl>
+                    <p:sldTgt/>
+                  </p:tgtEl>
+                </p:cond>
+              </p:nextCondLst>
+            </p:seq>
+          </p:childTnLst>
+        </p:cTn>
+      </p:par>
+    </p:tnLst>
+    <p:bldLst>
+      <p:bldP spid="3" grpId="0"/>
+    </p:bldLst>
+  </p:timing>
 </p:sld>
 </file>
 

</xml_diff>